<commit_message>
Presentation - Final: Adding some possible improvements for better analysis
</commit_message>
<xml_diff>
--- a/Presentation/Case Study - Presentation.pptx
+++ b/Presentation/Case Study - Presentation.pptx
@@ -5,35 +5,39 @@
     <p:sldMasterId id="2147483648" r:id="rId1"/>
   </p:sldMasterIdLst>
   <p:notesMasterIdLst>
-    <p:notesMasterId r:id="rId25"/>
+    <p:notesMasterId r:id="rId29"/>
   </p:notesMasterIdLst>
   <p:handoutMasterIdLst>
-    <p:handoutMasterId r:id="rId26"/>
+    <p:handoutMasterId r:id="rId30"/>
   </p:handoutMasterIdLst>
   <p:sldIdLst>
-    <p:sldId id="256" r:id="rId2"/>
-    <p:sldId id="275" r:id="rId3"/>
-    <p:sldId id="267" r:id="rId4"/>
-    <p:sldId id="258" r:id="rId5"/>
-    <p:sldId id="276" r:id="rId6"/>
-    <p:sldId id="263" r:id="rId7"/>
-    <p:sldId id="277" r:id="rId8"/>
-    <p:sldId id="260" r:id="rId9"/>
-    <p:sldId id="266" r:id="rId10"/>
-    <p:sldId id="278" r:id="rId11"/>
-    <p:sldId id="279" r:id="rId12"/>
-    <p:sldId id="280" r:id="rId13"/>
-    <p:sldId id="261" r:id="rId14"/>
-    <p:sldId id="281" r:id="rId15"/>
-    <p:sldId id="262" r:id="rId16"/>
-    <p:sldId id="268" r:id="rId17"/>
-    <p:sldId id="270" r:id="rId18"/>
-    <p:sldId id="271" r:id="rId19"/>
-    <p:sldId id="282" r:id="rId20"/>
-    <p:sldId id="283" r:id="rId21"/>
-    <p:sldId id="286" r:id="rId22"/>
-    <p:sldId id="272" r:id="rId23"/>
-    <p:sldId id="273" r:id="rId24"/>
+    <p:sldId id="287" r:id="rId2"/>
+    <p:sldId id="256" r:id="rId3"/>
+    <p:sldId id="275" r:id="rId4"/>
+    <p:sldId id="267" r:id="rId5"/>
+    <p:sldId id="258" r:id="rId6"/>
+    <p:sldId id="276" r:id="rId7"/>
+    <p:sldId id="263" r:id="rId8"/>
+    <p:sldId id="277" r:id="rId9"/>
+    <p:sldId id="260" r:id="rId10"/>
+    <p:sldId id="266" r:id="rId11"/>
+    <p:sldId id="278" r:id="rId12"/>
+    <p:sldId id="279" r:id="rId13"/>
+    <p:sldId id="280" r:id="rId14"/>
+    <p:sldId id="261" r:id="rId15"/>
+    <p:sldId id="281" r:id="rId16"/>
+    <p:sldId id="262" r:id="rId17"/>
+    <p:sldId id="268" r:id="rId18"/>
+    <p:sldId id="270" r:id="rId19"/>
+    <p:sldId id="271" r:id="rId20"/>
+    <p:sldId id="282" r:id="rId21"/>
+    <p:sldId id="283" r:id="rId22"/>
+    <p:sldId id="286" r:id="rId23"/>
+    <p:sldId id="272" r:id="rId24"/>
+    <p:sldId id="273" r:id="rId25"/>
+    <p:sldId id="290" r:id="rId26"/>
+    <p:sldId id="288" r:id="rId27"/>
+    <p:sldId id="289" r:id="rId28"/>
   </p:sldIdLst>
   <p:sldSz cx="12192000" cy="6858000"/>
   <p:notesSz cx="6858000" cy="9144000"/>
@@ -240,7 +244,7 @@
           <a:p>
             <a:fld id="{726AF5E2-7225-4B2B-9BAA-9899E67A39CD}" type="datetimeFigureOut">
               <a:rPr lang="en-US" smtClean="0"/>
-              <a:t>9/26/2024</a:t>
+              <a:t>9/27/2024</a:t>
             </a:fld>
             <a:endParaRPr lang="en-US" dirty="0"/>
           </a:p>
@@ -376,7 +380,7 @@
           <a:p>
             <a:fld id="{25C93E86-340B-4878-B198-F09408A7FEC6}" type="datetimeFigureOut">
               <a:rPr lang="en-US" smtClean="0"/>
-              <a:t>9/26/2024</a:t>
+              <a:t>9/27/2024</a:t>
             </a:fld>
             <a:endParaRPr lang="en-US"/>
           </a:p>
@@ -790,7 +794,7 @@
           <a:p>
             <a:fld id="{9A14E0AF-AD2A-4193-9655-79BDE8175BA9}" type="datetimeFigureOut">
               <a:rPr lang="en-US" smtClean="0"/>
-              <a:t>9/26/2024</a:t>
+              <a:t>9/27/2024</a:t>
             </a:fld>
             <a:endParaRPr lang="en-US"/>
           </a:p>
@@ -988,7 +992,7 @@
           <a:p>
             <a:fld id="{9A14E0AF-AD2A-4193-9655-79BDE8175BA9}" type="datetimeFigureOut">
               <a:rPr lang="en-US" smtClean="0"/>
-              <a:t>9/26/2024</a:t>
+              <a:t>9/27/2024</a:t>
             </a:fld>
             <a:endParaRPr lang="en-US"/>
           </a:p>
@@ -1196,7 +1200,7 @@
           <a:p>
             <a:fld id="{9A14E0AF-AD2A-4193-9655-79BDE8175BA9}" type="datetimeFigureOut">
               <a:rPr lang="en-US" smtClean="0"/>
-              <a:t>9/26/2024</a:t>
+              <a:t>9/27/2024</a:t>
             </a:fld>
             <a:endParaRPr lang="en-US"/>
           </a:p>
@@ -1394,7 +1398,7 @@
           <a:p>
             <a:fld id="{9A14E0AF-AD2A-4193-9655-79BDE8175BA9}" type="datetimeFigureOut">
               <a:rPr lang="en-US" smtClean="0"/>
-              <a:t>9/26/2024</a:t>
+              <a:t>9/27/2024</a:t>
             </a:fld>
             <a:endParaRPr lang="en-US"/>
           </a:p>
@@ -1669,7 +1673,7 @@
           <a:p>
             <a:fld id="{9A14E0AF-AD2A-4193-9655-79BDE8175BA9}" type="datetimeFigureOut">
               <a:rPr lang="en-US" smtClean="0"/>
-              <a:t>9/26/2024</a:t>
+              <a:t>9/27/2024</a:t>
             </a:fld>
             <a:endParaRPr lang="en-US"/>
           </a:p>
@@ -1934,7 +1938,7 @@
           <a:p>
             <a:fld id="{9A14E0AF-AD2A-4193-9655-79BDE8175BA9}" type="datetimeFigureOut">
               <a:rPr lang="en-US" smtClean="0"/>
-              <a:t>9/26/2024</a:t>
+              <a:t>9/27/2024</a:t>
             </a:fld>
             <a:endParaRPr lang="en-US"/>
           </a:p>
@@ -2346,7 +2350,7 @@
           <a:p>
             <a:fld id="{9A14E0AF-AD2A-4193-9655-79BDE8175BA9}" type="datetimeFigureOut">
               <a:rPr lang="en-US" smtClean="0"/>
-              <a:t>9/26/2024</a:t>
+              <a:t>9/27/2024</a:t>
             </a:fld>
             <a:endParaRPr lang="en-US"/>
           </a:p>
@@ -2487,7 +2491,7 @@
           <a:p>
             <a:fld id="{9A14E0AF-AD2A-4193-9655-79BDE8175BA9}" type="datetimeFigureOut">
               <a:rPr lang="en-US" smtClean="0"/>
-              <a:t>9/26/2024</a:t>
+              <a:t>9/27/2024</a:t>
             </a:fld>
             <a:endParaRPr lang="en-US"/>
           </a:p>
@@ -2600,7 +2604,7 @@
           <a:p>
             <a:fld id="{9A14E0AF-AD2A-4193-9655-79BDE8175BA9}" type="datetimeFigureOut">
               <a:rPr lang="en-US" smtClean="0"/>
-              <a:t>9/26/2024</a:t>
+              <a:t>9/27/2024</a:t>
             </a:fld>
             <a:endParaRPr lang="en-US"/>
           </a:p>
@@ -2911,7 +2915,7 @@
           <a:p>
             <a:fld id="{9A14E0AF-AD2A-4193-9655-79BDE8175BA9}" type="datetimeFigureOut">
               <a:rPr lang="en-US" smtClean="0"/>
-              <a:t>9/26/2024</a:t>
+              <a:t>9/27/2024</a:t>
             </a:fld>
             <a:endParaRPr lang="en-US"/>
           </a:p>
@@ -3199,7 +3203,7 @@
           <a:p>
             <a:fld id="{9A14E0AF-AD2A-4193-9655-79BDE8175BA9}" type="datetimeFigureOut">
               <a:rPr lang="en-US" smtClean="0"/>
-              <a:t>9/26/2024</a:t>
+              <a:t>9/27/2024</a:t>
             </a:fld>
             <a:endParaRPr lang="en-US"/>
           </a:p>
@@ -3440,7 +3444,7 @@
           <a:p>
             <a:fld id="{9A14E0AF-AD2A-4193-9655-79BDE8175BA9}" type="datetimeFigureOut">
               <a:rPr lang="en-US" smtClean="0"/>
-              <a:t>9/26/2024</a:t>
+              <a:t>9/27/2024</a:t>
             </a:fld>
             <a:endParaRPr lang="en-US"/>
           </a:p>
@@ -3859,6 +3863,140 @@
       </p:grpSpPr>
       <p:sp>
         <p:nvSpPr>
+          <p:cNvPr id="2" name="Title 1">
+            <a:extLst>
+              <a:ext uri="{FF2B5EF4-FFF2-40B4-BE49-F238E27FC236}">
+                <a16:creationId xmlns:a16="http://schemas.microsoft.com/office/drawing/2014/main" id="{883F236C-5E18-2942-47D7-0DD594DC7A88}"/>
+              </a:ext>
+            </a:extLst>
+          </p:cNvPr>
+          <p:cNvSpPr>
+            <a:spLocks noGrp="1"/>
+          </p:cNvSpPr>
+          <p:nvPr>
+            <p:ph type="title"/>
+          </p:nvPr>
+        </p:nvSpPr>
+        <p:spPr>
+          <a:xfrm>
+            <a:off x="0" y="1593908"/>
+            <a:ext cx="12192000" cy="2497873"/>
+          </a:xfrm>
+        </p:spPr>
+        <p:txBody>
+          <a:bodyPr>
+            <a:normAutofit/>
+          </a:bodyPr>
+          <a:lstStyle/>
+          <a:p>
+            <a:pPr algn="ctr"/>
+            <a:r>
+              <a:rPr lang="en-US" dirty="0">
+                <a:solidFill>
+                  <a:schemeClr val="accent1"/>
+                </a:solidFill>
+                <a:latin typeface="Comic Sans MS" panose="030F0702030302020204" pitchFamily="66" charset="0"/>
+              </a:rPr>
+              <a:t>Case Study</a:t>
+            </a:r>
+            <a:br>
+              <a:rPr lang="en-US" dirty="0">
+                <a:latin typeface="Comic Sans MS" panose="030F0702030302020204" pitchFamily="66" charset="0"/>
+              </a:rPr>
+            </a:br>
+            <a:br>
+              <a:rPr lang="en-US" dirty="0">
+                <a:latin typeface="Comic Sans MS" panose="030F0702030302020204" pitchFamily="66" charset="0"/>
+              </a:rPr>
+            </a:br>
+            <a:r>
+              <a:rPr lang="en-US" dirty="0">
+                <a:latin typeface="Comic Sans MS" panose="030F0702030302020204" pitchFamily="66" charset="0"/>
+              </a:rPr>
+              <a:t>NYC Bikes Analysis</a:t>
+            </a:r>
+          </a:p>
+        </p:txBody>
+      </p:sp>
+      <p:pic>
+        <p:nvPicPr>
+          <p:cNvPr id="4" name="Picture 2" descr="FIRN Analytics: Timely Data Solutions &amp; Expert Consultancy">
+            <a:extLst>
+              <a:ext uri="{FF2B5EF4-FFF2-40B4-BE49-F238E27FC236}">
+                <a16:creationId xmlns:a16="http://schemas.microsoft.com/office/drawing/2014/main" id="{0D3F4448-E6E0-C59E-2593-0622D931C4D1}"/>
+              </a:ext>
+            </a:extLst>
+          </p:cNvPr>
+          <p:cNvPicPr>
+            <a:picLocks noChangeAspect="1" noChangeArrowheads="1"/>
+          </p:cNvPicPr>
+          <p:nvPr/>
+        </p:nvPicPr>
+        <p:blipFill>
+          <a:blip r:embed="rId2">
+            <a:extLst>
+              <a:ext uri="{28A0092B-C50C-407E-A947-70E740481C1C}">
+                <a14:useLocalDpi xmlns:a14="http://schemas.microsoft.com/office/drawing/2010/main" val="0"/>
+              </a:ext>
+            </a:extLst>
+          </a:blip>
+          <a:srcRect/>
+          <a:stretch>
+            <a:fillRect/>
+          </a:stretch>
+        </p:blipFill>
+        <p:spPr bwMode="auto">
+          <a:xfrm>
+            <a:off x="11182350" y="5848350"/>
+            <a:ext cx="1009650" cy="1009650"/>
+          </a:xfrm>
+          <a:prstGeom prst="rect">
+            <a:avLst/>
+          </a:prstGeom>
+          <a:noFill/>
+          <a:extLst>
+            <a:ext uri="{909E8E84-426E-40DD-AFC4-6F175D3DCCD1}">
+              <a14:hiddenFill xmlns:a14="http://schemas.microsoft.com/office/drawing/2010/main">
+                <a:solidFill>
+                  <a:srgbClr val="FFFFFF"/>
+                </a:solidFill>
+              </a14:hiddenFill>
+            </a:ext>
+          </a:extLst>
+        </p:spPr>
+      </p:pic>
+    </p:spTree>
+    <p:extLst>
+      <p:ext uri="{BB962C8B-B14F-4D97-AF65-F5344CB8AC3E}">
+        <p14:creationId xmlns:p14="http://schemas.microsoft.com/office/powerpoint/2010/main" val="1825291832"/>
+      </p:ext>
+    </p:extLst>
+  </p:cSld>
+  <p:clrMapOvr>
+    <a:masterClrMapping/>
+  </p:clrMapOvr>
+</p:sld>
+</file>
+
+<file path=ppt/slides/slide10.xml><?xml version="1.0" encoding="utf-8"?>
+<p:sld xmlns:a="http://schemas.openxmlformats.org/drawingml/2006/main" xmlns:r="http://schemas.openxmlformats.org/officeDocument/2006/relationships" xmlns:p="http://schemas.openxmlformats.org/presentationml/2006/main">
+  <p:cSld>
+    <p:spTree>
+      <p:nvGrpSpPr>
+        <p:cNvPr id="1" name=""/>
+        <p:cNvGrpSpPr/>
+        <p:nvPr/>
+      </p:nvGrpSpPr>
+      <p:grpSpPr>
+        <a:xfrm>
+          <a:off x="0" y="0"/>
+          <a:ext cx="0" cy="0"/>
+          <a:chOff x="0" y="0"/>
+          <a:chExt cx="0" cy="0"/>
+        </a:xfrm>
+      </p:grpSpPr>
+      <p:sp>
+        <p:nvSpPr>
           <p:cNvPr id="2" name="TextBox 1">
             <a:extLst>
               <a:ext uri="{FF2B5EF4-FFF2-40B4-BE49-F238E27FC236}">
@@ -3893,17 +4031,461 @@
                 </a:solidFill>
                 <a:latin typeface="Calisto MT" panose="02040603050505030304" pitchFamily="18" charset="0"/>
               </a:rPr>
-              <a:t>DW/BI Lifecycle</a:t>
+              <a:t>Dbt Cloud – Connect to Snowflake via Partner Connect</a:t>
             </a:r>
           </a:p>
         </p:txBody>
       </p:sp>
+      <p:grpSp>
+        <p:nvGrpSpPr>
+          <p:cNvPr id="28" name="Group 27">
+            <a:extLst>
+              <a:ext uri="{FF2B5EF4-FFF2-40B4-BE49-F238E27FC236}">
+                <a16:creationId xmlns:a16="http://schemas.microsoft.com/office/drawing/2014/main" id="{A804D14B-5C44-4BD6-B1F0-9292D7F7B520}"/>
+              </a:ext>
+            </a:extLst>
+          </p:cNvPr>
+          <p:cNvGrpSpPr/>
+          <p:nvPr/>
+        </p:nvGrpSpPr>
+        <p:grpSpPr>
+          <a:xfrm>
+            <a:off x="404812" y="1431037"/>
+            <a:ext cx="11382375" cy="4327255"/>
+            <a:chOff x="0" y="1659637"/>
+            <a:chExt cx="11382375" cy="4327255"/>
+          </a:xfrm>
+        </p:grpSpPr>
+        <p:grpSp>
+          <p:nvGrpSpPr>
+            <p:cNvPr id="21" name="Group 20">
+              <a:extLst>
+                <a:ext uri="{FF2B5EF4-FFF2-40B4-BE49-F238E27FC236}">
+                  <a16:creationId xmlns:a16="http://schemas.microsoft.com/office/drawing/2014/main" id="{4B45B0D1-99CF-86C4-71B8-FDF85EFDD0BF}"/>
+                </a:ext>
+              </a:extLst>
+            </p:cNvPr>
+            <p:cNvGrpSpPr/>
+            <p:nvPr/>
+          </p:nvGrpSpPr>
+          <p:grpSpPr>
+            <a:xfrm>
+              <a:off x="0" y="1659637"/>
+              <a:ext cx="11382375" cy="4327255"/>
+              <a:chOff x="0" y="1659637"/>
+              <a:chExt cx="11382375" cy="4327255"/>
+            </a:xfrm>
+          </p:grpSpPr>
+          <p:pic>
+            <p:nvPicPr>
+              <p:cNvPr id="1026" name="Picture 2" descr="Snowflake Partner Connect Box">
+                <a:extLst>
+                  <a:ext uri="{FF2B5EF4-FFF2-40B4-BE49-F238E27FC236}">
+                    <a16:creationId xmlns:a16="http://schemas.microsoft.com/office/drawing/2014/main" id="{15FFF6E1-5538-115A-23B0-F6D96A68F38D}"/>
+                  </a:ext>
+                </a:extLst>
+              </p:cNvPr>
+              <p:cNvPicPr>
+                <a:picLocks noChangeAspect="1" noChangeArrowheads="1"/>
+              </p:cNvPicPr>
+              <p:nvPr/>
+            </p:nvPicPr>
+            <p:blipFill>
+              <a:blip r:embed="rId2">
+                <a:extLst>
+                  <a:ext uri="{28A0092B-C50C-407E-A947-70E740481C1C}">
+                    <a14:useLocalDpi xmlns:a14="http://schemas.microsoft.com/office/drawing/2010/main" val="0"/>
+                  </a:ext>
+                </a:extLst>
+              </a:blip>
+              <a:srcRect/>
+              <a:stretch>
+                <a:fillRect/>
+              </a:stretch>
+            </p:blipFill>
+            <p:spPr bwMode="auto">
+              <a:xfrm>
+                <a:off x="0" y="2419349"/>
+                <a:ext cx="3446941" cy="3038475"/>
+              </a:xfrm>
+              <a:prstGeom prst="rect">
+                <a:avLst/>
+              </a:prstGeom>
+              <a:noFill/>
+              <a:extLst>
+                <a:ext uri="{909E8E84-426E-40DD-AFC4-6F175D3DCCD1}">
+                  <a14:hiddenFill xmlns:a14="http://schemas.microsoft.com/office/drawing/2010/main">
+                    <a:solidFill>
+                      <a:srgbClr val="FFFFFF"/>
+                    </a:solidFill>
+                  </a14:hiddenFill>
+                </a:ext>
+              </a:extLst>
+            </p:spPr>
+          </p:pic>
+          <p:pic>
+            <p:nvPicPr>
+              <p:cNvPr id="1030" name="Picture 6" descr="Snowflake New UI - Connection Box">
+                <a:extLst>
+                  <a:ext uri="{FF2B5EF4-FFF2-40B4-BE49-F238E27FC236}">
+                    <a16:creationId xmlns:a16="http://schemas.microsoft.com/office/drawing/2014/main" id="{66723F01-75B2-E582-6649-ABB958F404C6}"/>
+                  </a:ext>
+                </a:extLst>
+              </p:cNvPr>
+              <p:cNvPicPr>
+                <a:picLocks noChangeAspect="1" noChangeArrowheads="1"/>
+              </p:cNvPicPr>
+              <p:nvPr/>
+            </p:nvPicPr>
+            <p:blipFill>
+              <a:blip r:embed="rId3">
+                <a:extLst>
+                  <a:ext uri="{28A0092B-C50C-407E-A947-70E740481C1C}">
+                    <a14:useLocalDpi xmlns:a14="http://schemas.microsoft.com/office/drawing/2010/main" val="0"/>
+                  </a:ext>
+                </a:extLst>
+              </a:blip>
+              <a:srcRect/>
+              <a:stretch>
+                <a:fillRect/>
+              </a:stretch>
+            </p:blipFill>
+            <p:spPr bwMode="auto">
+              <a:xfrm>
+                <a:off x="4278462" y="2105026"/>
+                <a:ext cx="3113660" cy="3667124"/>
+              </a:xfrm>
+              <a:prstGeom prst="rect">
+                <a:avLst/>
+              </a:prstGeom>
+              <a:noFill/>
+              <a:extLst>
+                <a:ext uri="{909E8E84-426E-40DD-AFC4-6F175D3DCCD1}">
+                  <a14:hiddenFill xmlns:a14="http://schemas.microsoft.com/office/drawing/2010/main">
+                    <a:solidFill>
+                      <a:srgbClr val="FFFFFF"/>
+                    </a:solidFill>
+                  </a14:hiddenFill>
+                </a:ext>
+              </a:extLst>
+            </p:spPr>
+          </p:pic>
+          <p:grpSp>
+            <p:nvGrpSpPr>
+              <p:cNvPr id="17" name="Group 16">
+                <a:extLst>
+                  <a:ext uri="{FF2B5EF4-FFF2-40B4-BE49-F238E27FC236}">
+                    <a16:creationId xmlns:a16="http://schemas.microsoft.com/office/drawing/2014/main" id="{B1A400E6-3BE8-AD15-A44F-FBC400C79111}"/>
+                  </a:ext>
+                </a:extLst>
+              </p:cNvPr>
+              <p:cNvGrpSpPr/>
+              <p:nvPr/>
+            </p:nvGrpSpPr>
+            <p:grpSpPr>
+              <a:xfrm>
+                <a:off x="8425013" y="2205037"/>
+                <a:ext cx="2957362" cy="3781855"/>
+                <a:chOff x="8425013" y="1557337"/>
+                <a:chExt cx="2957362" cy="3781855"/>
+              </a:xfrm>
+            </p:grpSpPr>
+            <p:pic>
+              <p:nvPicPr>
+                <p:cNvPr id="4" name="Picture 3">
+                  <a:extLst>
+                    <a:ext uri="{FF2B5EF4-FFF2-40B4-BE49-F238E27FC236}">
+                      <a16:creationId xmlns:a16="http://schemas.microsoft.com/office/drawing/2014/main" id="{7372E2F3-A85C-CAEE-F762-194295DCD4D5}"/>
+                    </a:ext>
+                  </a:extLst>
+                </p:cNvPr>
+                <p:cNvPicPr>
+                  <a:picLocks noChangeAspect="1"/>
+                </p:cNvPicPr>
+                <p:nvPr/>
+              </p:nvPicPr>
+              <p:blipFill>
+                <a:blip r:embed="rId4"/>
+                <a:srcRect r="66002"/>
+                <a:stretch/>
+              </p:blipFill>
+              <p:spPr>
+                <a:xfrm>
+                  <a:off x="8425014" y="3852863"/>
+                  <a:ext cx="2407218" cy="1486329"/>
+                </a:xfrm>
+                <a:prstGeom prst="rect">
+                  <a:avLst/>
+                </a:prstGeom>
+              </p:spPr>
+            </p:pic>
+            <p:pic>
+              <p:nvPicPr>
+                <p:cNvPr id="9" name="Picture 8">
+                  <a:extLst>
+                    <a:ext uri="{FF2B5EF4-FFF2-40B4-BE49-F238E27FC236}">
+                      <a16:creationId xmlns:a16="http://schemas.microsoft.com/office/drawing/2014/main" id="{F08D0736-E2E2-28B6-C09D-DC3003FC5B82}"/>
+                    </a:ext>
+                  </a:extLst>
+                </p:cNvPr>
+                <p:cNvPicPr>
+                  <a:picLocks noChangeAspect="1"/>
+                </p:cNvPicPr>
+                <p:nvPr/>
+              </p:nvPicPr>
+              <p:blipFill>
+                <a:blip r:embed="rId5"/>
+                <a:srcRect l="-1" t="69885" r="54876"/>
+                <a:stretch/>
+              </p:blipFill>
+              <p:spPr>
+                <a:xfrm>
+                  <a:off x="8425013" y="2705100"/>
+                  <a:ext cx="2957362" cy="1009795"/>
+                </a:xfrm>
+                <a:prstGeom prst="rect">
+                  <a:avLst/>
+                </a:prstGeom>
+              </p:spPr>
+            </p:pic>
+            <p:pic>
+              <p:nvPicPr>
+                <p:cNvPr id="14" name="Picture 13">
+                  <a:extLst>
+                    <a:ext uri="{FF2B5EF4-FFF2-40B4-BE49-F238E27FC236}">
+                      <a16:creationId xmlns:a16="http://schemas.microsoft.com/office/drawing/2014/main" id="{4C0CA0B4-E251-3639-3306-9DB0199F1E2C}"/>
+                    </a:ext>
+                  </a:extLst>
+                </p:cNvPr>
+                <p:cNvPicPr>
+                  <a:picLocks noChangeAspect="1"/>
+                </p:cNvPicPr>
+                <p:nvPr/>
+              </p:nvPicPr>
+              <p:blipFill>
+                <a:blip r:embed="rId5"/>
+                <a:srcRect r="60286" b="65770"/>
+                <a:stretch/>
+              </p:blipFill>
+              <p:spPr>
+                <a:xfrm>
+                  <a:off x="8425014" y="1557337"/>
+                  <a:ext cx="2407218" cy="1147763"/>
+                </a:xfrm>
+                <a:prstGeom prst="rect">
+                  <a:avLst/>
+                </a:prstGeom>
+              </p:spPr>
+            </p:pic>
+          </p:grpSp>
+          <p:sp>
+            <p:nvSpPr>
+              <p:cNvPr id="18" name="TextBox 17">
+                <a:extLst>
+                  <a:ext uri="{FF2B5EF4-FFF2-40B4-BE49-F238E27FC236}">
+                    <a16:creationId xmlns:a16="http://schemas.microsoft.com/office/drawing/2014/main" id="{F7A1BBAA-12B2-57C9-EA76-77C5962B09E0}"/>
+                  </a:ext>
+                </a:extLst>
+              </p:cNvPr>
+              <p:cNvSpPr txBox="1"/>
+              <p:nvPr/>
+            </p:nvSpPr>
+            <p:spPr>
+              <a:xfrm>
+                <a:off x="1318658" y="1659637"/>
+                <a:ext cx="809624" cy="369332"/>
+              </a:xfrm>
+              <a:prstGeom prst="rect">
+                <a:avLst/>
+              </a:prstGeom>
+              <a:noFill/>
+            </p:spPr>
+            <p:txBody>
+              <a:bodyPr wrap="square" rtlCol="0">
+                <a:spAutoFit/>
+              </a:bodyPr>
+              <a:lstStyle/>
+              <a:p>
+                <a:r>
+                  <a:rPr lang="en-US" dirty="0">
+                    <a:solidFill>
+                      <a:srgbClr val="00B0F0"/>
+                    </a:solidFill>
+                  </a:rPr>
+                  <a:t>Step 1</a:t>
+                </a:r>
+              </a:p>
+            </p:txBody>
+          </p:sp>
+          <p:sp>
+            <p:nvSpPr>
+              <p:cNvPr id="19" name="TextBox 18">
+                <a:extLst>
+                  <a:ext uri="{FF2B5EF4-FFF2-40B4-BE49-F238E27FC236}">
+                    <a16:creationId xmlns:a16="http://schemas.microsoft.com/office/drawing/2014/main" id="{F7DFB7E8-CEE0-0CFE-A298-2F02B083BDA8}"/>
+                  </a:ext>
+                </a:extLst>
+              </p:cNvPr>
+              <p:cNvSpPr txBox="1"/>
+              <p:nvPr/>
+            </p:nvSpPr>
+            <p:spPr>
+              <a:xfrm>
+                <a:off x="5430480" y="1659637"/>
+                <a:ext cx="809624" cy="369332"/>
+              </a:xfrm>
+              <a:prstGeom prst="rect">
+                <a:avLst/>
+              </a:prstGeom>
+              <a:noFill/>
+            </p:spPr>
+            <p:txBody>
+              <a:bodyPr wrap="square" rtlCol="0">
+                <a:spAutoFit/>
+              </a:bodyPr>
+              <a:lstStyle/>
+              <a:p>
+                <a:r>
+                  <a:rPr lang="en-US" dirty="0">
+                    <a:solidFill>
+                      <a:srgbClr val="00B0F0"/>
+                    </a:solidFill>
+                  </a:rPr>
+                  <a:t>Step 2</a:t>
+                </a:r>
+              </a:p>
+            </p:txBody>
+          </p:sp>
+          <p:sp>
+            <p:nvSpPr>
+              <p:cNvPr id="20" name="TextBox 19">
+                <a:extLst>
+                  <a:ext uri="{FF2B5EF4-FFF2-40B4-BE49-F238E27FC236}">
+                    <a16:creationId xmlns:a16="http://schemas.microsoft.com/office/drawing/2014/main" id="{7AC52878-3692-FB2A-1322-BEE5B3070048}"/>
+                  </a:ext>
+                </a:extLst>
+              </p:cNvPr>
+              <p:cNvSpPr txBox="1"/>
+              <p:nvPr/>
+            </p:nvSpPr>
+            <p:spPr>
+              <a:xfrm>
+                <a:off x="9326205" y="1659637"/>
+                <a:ext cx="809624" cy="369332"/>
+              </a:xfrm>
+              <a:prstGeom prst="rect">
+                <a:avLst/>
+              </a:prstGeom>
+              <a:noFill/>
+            </p:spPr>
+            <p:txBody>
+              <a:bodyPr wrap="square" rtlCol="0">
+                <a:spAutoFit/>
+              </a:bodyPr>
+              <a:lstStyle/>
+              <a:p>
+                <a:r>
+                  <a:rPr lang="en-US" dirty="0">
+                    <a:solidFill>
+                      <a:schemeClr val="accent2"/>
+                    </a:solidFill>
+                  </a:rPr>
+                  <a:t>Step 3</a:t>
+                </a:r>
+              </a:p>
+            </p:txBody>
+          </p:sp>
+        </p:grpSp>
+        <p:cxnSp>
+          <p:nvCxnSpPr>
+            <p:cNvPr id="23" name="Straight Arrow Connector 22">
+              <a:extLst>
+                <a:ext uri="{FF2B5EF4-FFF2-40B4-BE49-F238E27FC236}">
+                  <a16:creationId xmlns:a16="http://schemas.microsoft.com/office/drawing/2014/main" id="{3A61F3D3-DD3F-9229-6E88-2475FFA937B2}"/>
+                </a:ext>
+              </a:extLst>
+            </p:cNvPr>
+            <p:cNvCxnSpPr>
+              <a:stCxn id="1026" idx="3"/>
+              <a:endCxn id="1030" idx="1"/>
+            </p:cNvCxnSpPr>
+            <p:nvPr/>
+          </p:nvCxnSpPr>
+          <p:spPr>
+            <a:xfrm>
+              <a:off x="3446941" y="3938587"/>
+              <a:ext cx="831521" cy="1"/>
+            </a:xfrm>
+            <a:prstGeom prst="straightConnector1">
+              <a:avLst/>
+            </a:prstGeom>
+            <a:ln w="38100">
+              <a:tailEnd type="triangle"/>
+            </a:ln>
+          </p:spPr>
+          <p:style>
+            <a:lnRef idx="3">
+              <a:schemeClr val="dk1"/>
+            </a:lnRef>
+            <a:fillRef idx="0">
+              <a:schemeClr val="dk1"/>
+            </a:fillRef>
+            <a:effectRef idx="2">
+              <a:schemeClr val="dk1"/>
+            </a:effectRef>
+            <a:fontRef idx="minor">
+              <a:schemeClr val="tx1"/>
+            </a:fontRef>
+          </p:style>
+        </p:cxnSp>
+        <p:cxnSp>
+          <p:nvCxnSpPr>
+            <p:cNvPr id="25" name="Straight Arrow Connector 24">
+              <a:extLst>
+                <a:ext uri="{FF2B5EF4-FFF2-40B4-BE49-F238E27FC236}">
+                  <a16:creationId xmlns:a16="http://schemas.microsoft.com/office/drawing/2014/main" id="{CF0D9792-C16B-5821-6F1B-B480FB1B977C}"/>
+                </a:ext>
+              </a:extLst>
+            </p:cNvPr>
+            <p:cNvCxnSpPr>
+              <a:cxnSpLocks/>
+            </p:cNvCxnSpPr>
+            <p:nvPr/>
+          </p:nvCxnSpPr>
+          <p:spPr>
+            <a:xfrm>
+              <a:off x="7593491" y="3938586"/>
+              <a:ext cx="831521" cy="1"/>
+            </a:xfrm>
+            <a:prstGeom prst="straightConnector1">
+              <a:avLst/>
+            </a:prstGeom>
+            <a:ln w="38100">
+              <a:tailEnd type="triangle"/>
+            </a:ln>
+          </p:spPr>
+          <p:style>
+            <a:lnRef idx="3">
+              <a:schemeClr val="dk1"/>
+            </a:lnRef>
+            <a:fillRef idx="0">
+              <a:schemeClr val="dk1"/>
+            </a:fillRef>
+            <a:effectRef idx="2">
+              <a:schemeClr val="dk1"/>
+            </a:effectRef>
+            <a:fontRef idx="minor">
+              <a:schemeClr val="tx1"/>
+            </a:fontRef>
+          </p:style>
+        </p:cxnSp>
+      </p:grpSp>
       <p:pic>
         <p:nvPicPr>
-          <p:cNvPr id="2050" name="Picture 2" descr="FIRN Analytics: Timely Data Solutions &amp; Expert Consultancy">
+          <p:cNvPr id="30" name="Picture 2" descr="FIRN Analytics: Timely Data Solutions &amp; Expert Consultancy">
             <a:extLst>
               <a:ext uri="{FF2B5EF4-FFF2-40B4-BE49-F238E27FC236}">
-                <a16:creationId xmlns:a16="http://schemas.microsoft.com/office/drawing/2014/main" id="{14A52F25-2DAE-5DA7-4039-D4DC6699D305}"/>
+                <a16:creationId xmlns:a16="http://schemas.microsoft.com/office/drawing/2014/main" id="{EC4E0CB6-A9A1-AA93-273B-B557BE6509DC}"/>
               </a:ext>
             </a:extLst>
           </p:cNvPr>
@@ -3913,7 +4495,7 @@
           <p:nvPr/>
         </p:nvPicPr>
         <p:blipFill>
-          <a:blip r:embed="rId2">
+          <a:blip r:embed="rId6">
             <a:extLst>
               <a:ext uri="{28A0092B-C50C-407E-A947-70E740481C1C}">
                 <a14:useLocalDpi xmlns:a14="http://schemas.microsoft.com/office/drawing/2010/main" val="0"/>
@@ -3945,40 +4527,10 @@
           </a:extLst>
         </p:spPr>
       </p:pic>
-      <p:pic>
-        <p:nvPicPr>
-          <p:cNvPr id="8" name="Picture 7">
-            <a:extLst>
-              <a:ext uri="{FF2B5EF4-FFF2-40B4-BE49-F238E27FC236}">
-                <a16:creationId xmlns:a16="http://schemas.microsoft.com/office/drawing/2014/main" id="{5A94F403-93A2-5405-E673-A3B5A186DAC9}"/>
-              </a:ext>
-            </a:extLst>
-          </p:cNvPr>
-          <p:cNvPicPr>
-            <a:picLocks noChangeAspect="1"/>
-          </p:cNvPicPr>
-          <p:nvPr/>
-        </p:nvPicPr>
-        <p:blipFill>
-          <a:blip r:embed="rId3"/>
-          <a:stretch>
-            <a:fillRect/>
-          </a:stretch>
-        </p:blipFill>
-        <p:spPr>
-          <a:xfrm>
-            <a:off x="2832167" y="1790217"/>
-            <a:ext cx="6527666" cy="3277565"/>
-          </a:xfrm>
-          <a:prstGeom prst="rect">
-            <a:avLst/>
-          </a:prstGeom>
-        </p:spPr>
-      </p:pic>
     </p:spTree>
     <p:extLst>
       <p:ext uri="{BB962C8B-B14F-4D97-AF65-F5344CB8AC3E}">
-        <p14:creationId xmlns:p14="http://schemas.microsoft.com/office/powerpoint/2010/main" val="1327095021"/>
+        <p14:creationId xmlns:p14="http://schemas.microsoft.com/office/powerpoint/2010/main" val="1547502742"/>
       </p:ext>
     </p:extLst>
   </p:cSld>
@@ -3988,7 +4540,7 @@
 </p:sld>
 </file>
 
-<file path=ppt/slides/slide10.xml><?xml version="1.0" encoding="utf-8"?>
+<file path=ppt/slides/slide11.xml><?xml version="1.0" encoding="utf-8"?>
 <p:sld xmlns:a="http://schemas.openxmlformats.org/drawingml/2006/main" xmlns:r="http://schemas.openxmlformats.org/officeDocument/2006/relationships" xmlns:p="http://schemas.openxmlformats.org/presentationml/2006/main">
   <p:cSld>
     <p:spTree>
@@ -4194,7 +4746,7 @@
 </p:sld>
 </file>
 
-<file path=ppt/slides/slide11.xml><?xml version="1.0" encoding="utf-8"?>
+<file path=ppt/slides/slide12.xml><?xml version="1.0" encoding="utf-8"?>
 <p:sld xmlns:a="http://schemas.openxmlformats.org/drawingml/2006/main" xmlns:r="http://schemas.openxmlformats.org/officeDocument/2006/relationships" xmlns:p="http://schemas.openxmlformats.org/presentationml/2006/main">
   <p:cSld>
     <p:spTree>
@@ -4485,7 +5037,7 @@
 </p:sld>
 </file>
 
-<file path=ppt/slides/slide12.xml><?xml version="1.0" encoding="utf-8"?>
+<file path=ppt/slides/slide13.xml><?xml version="1.0" encoding="utf-8"?>
 <p:sld xmlns:a="http://schemas.openxmlformats.org/drawingml/2006/main" xmlns:r="http://schemas.openxmlformats.org/officeDocument/2006/relationships" xmlns:p="http://schemas.openxmlformats.org/presentationml/2006/main">
   <p:cSld>
     <p:spTree>
@@ -4691,7 +5243,7 @@
 </p:sld>
 </file>
 
-<file path=ppt/slides/slide13.xml><?xml version="1.0" encoding="utf-8"?>
+<file path=ppt/slides/slide14.xml><?xml version="1.0" encoding="utf-8"?>
 <p:sld xmlns:a="http://schemas.openxmlformats.org/drawingml/2006/main" xmlns:r="http://schemas.openxmlformats.org/officeDocument/2006/relationships" xmlns:p="http://schemas.openxmlformats.org/presentationml/2006/main">
   <p:cSld>
     <p:spTree>
@@ -5386,7 +5938,7 @@
 </p:sld>
 </file>
 
-<file path=ppt/slides/slide14.xml><?xml version="1.0" encoding="utf-8"?>
+<file path=ppt/slides/slide15.xml><?xml version="1.0" encoding="utf-8"?>
 <p:sld xmlns:a="http://schemas.openxmlformats.org/drawingml/2006/main" xmlns:r="http://schemas.openxmlformats.org/officeDocument/2006/relationships" xmlns:p="http://schemas.openxmlformats.org/presentationml/2006/main">
   <p:cSld>
     <p:spTree>
@@ -5592,7 +6144,7 @@
 </p:sld>
 </file>
 
-<file path=ppt/slides/slide15.xml><?xml version="1.0" encoding="utf-8"?>
+<file path=ppt/slides/slide16.xml><?xml version="1.0" encoding="utf-8"?>
 <p:sld xmlns:a="http://schemas.openxmlformats.org/drawingml/2006/main" xmlns:r="http://schemas.openxmlformats.org/officeDocument/2006/relationships" xmlns:p="http://schemas.openxmlformats.org/presentationml/2006/main">
   <p:cSld>
     <p:spTree>
@@ -6624,7 +7176,7 @@
 </p:sld>
 </file>
 
-<file path=ppt/slides/slide16.xml><?xml version="1.0" encoding="utf-8"?>
+<file path=ppt/slides/slide17.xml><?xml version="1.0" encoding="utf-8"?>
 <p:sld xmlns:a="http://schemas.openxmlformats.org/drawingml/2006/main" xmlns:r="http://schemas.openxmlformats.org/officeDocument/2006/relationships" xmlns:p="http://schemas.openxmlformats.org/presentationml/2006/main">
   <p:cSld>
     <p:spTree>
@@ -7291,7 +7843,7 @@
 </p:sld>
 </file>
 
-<file path=ppt/slides/slide17.xml><?xml version="1.0" encoding="utf-8"?>
+<file path=ppt/slides/slide18.xml><?xml version="1.0" encoding="utf-8"?>
 <p:sld xmlns:a="http://schemas.openxmlformats.org/drawingml/2006/main" xmlns:r="http://schemas.openxmlformats.org/officeDocument/2006/relationships" xmlns:p="http://schemas.openxmlformats.org/presentationml/2006/main">
   <p:cSld>
     <p:spTree>
@@ -7961,7 +8513,7 @@
 </p:sld>
 </file>
 
-<file path=ppt/slides/slide18.xml><?xml version="1.0" encoding="utf-8"?>
+<file path=ppt/slides/slide19.xml><?xml version="1.0" encoding="utf-8"?>
 <p:sld xmlns:a="http://schemas.openxmlformats.org/drawingml/2006/main" xmlns:r="http://schemas.openxmlformats.org/officeDocument/2006/relationships" xmlns:p="http://schemas.openxmlformats.org/presentationml/2006/main">
   <p:cSld>
     <p:spTree>
@@ -8682,7 +9234,155 @@
 </p:sld>
 </file>
 
-<file path=ppt/slides/slide19.xml><?xml version="1.0" encoding="utf-8"?>
+<file path=ppt/slides/slide2.xml><?xml version="1.0" encoding="utf-8"?>
+<p:sld xmlns:a="http://schemas.openxmlformats.org/drawingml/2006/main" xmlns:r="http://schemas.openxmlformats.org/officeDocument/2006/relationships" xmlns:p="http://schemas.openxmlformats.org/presentationml/2006/main">
+  <p:cSld>
+    <p:spTree>
+      <p:nvGrpSpPr>
+        <p:cNvPr id="1" name=""/>
+        <p:cNvGrpSpPr/>
+        <p:nvPr/>
+      </p:nvGrpSpPr>
+      <p:grpSpPr>
+        <a:xfrm>
+          <a:off x="0" y="0"/>
+          <a:ext cx="0" cy="0"/>
+          <a:chOff x="0" y="0"/>
+          <a:chExt cx="0" cy="0"/>
+        </a:xfrm>
+      </p:grpSpPr>
+      <p:sp>
+        <p:nvSpPr>
+          <p:cNvPr id="2" name="TextBox 1">
+            <a:extLst>
+              <a:ext uri="{FF2B5EF4-FFF2-40B4-BE49-F238E27FC236}">
+                <a16:creationId xmlns:a16="http://schemas.microsoft.com/office/drawing/2014/main" id="{15726383-B407-319E-030C-10F657ACC3A3}"/>
+              </a:ext>
+            </a:extLst>
+          </p:cNvPr>
+          <p:cNvSpPr txBox="1"/>
+          <p:nvPr/>
+        </p:nvSpPr>
+        <p:spPr>
+          <a:xfrm>
+            <a:off x="0" y="323165"/>
+            <a:ext cx="12192000" cy="646331"/>
+          </a:xfrm>
+          <a:prstGeom prst="rect">
+            <a:avLst/>
+          </a:prstGeom>
+          <a:noFill/>
+        </p:spPr>
+        <p:txBody>
+          <a:bodyPr wrap="square" rtlCol="0">
+            <a:spAutoFit/>
+          </a:bodyPr>
+          <a:lstStyle/>
+          <a:p>
+            <a:pPr algn="ctr"/>
+            <a:r>
+              <a:rPr lang="en-US" sz="3600" i="1" dirty="0">
+                <a:solidFill>
+                  <a:srgbClr val="7030A0"/>
+                </a:solidFill>
+                <a:latin typeface="Calisto MT" panose="02040603050505030304" pitchFamily="18" charset="0"/>
+              </a:rPr>
+              <a:t>Kimball DW/BI Lifecycle</a:t>
+            </a:r>
+          </a:p>
+        </p:txBody>
+      </p:sp>
+      <p:pic>
+        <p:nvPicPr>
+          <p:cNvPr id="2050" name="Picture 2" descr="FIRN Analytics: Timely Data Solutions &amp; Expert Consultancy">
+            <a:extLst>
+              <a:ext uri="{FF2B5EF4-FFF2-40B4-BE49-F238E27FC236}">
+                <a16:creationId xmlns:a16="http://schemas.microsoft.com/office/drawing/2014/main" id="{14A52F25-2DAE-5DA7-4039-D4DC6699D305}"/>
+              </a:ext>
+            </a:extLst>
+          </p:cNvPr>
+          <p:cNvPicPr>
+            <a:picLocks noChangeAspect="1" noChangeArrowheads="1"/>
+          </p:cNvPicPr>
+          <p:nvPr/>
+        </p:nvPicPr>
+        <p:blipFill>
+          <a:blip r:embed="rId2">
+            <a:extLst>
+              <a:ext uri="{28A0092B-C50C-407E-A947-70E740481C1C}">
+                <a14:useLocalDpi xmlns:a14="http://schemas.microsoft.com/office/drawing/2010/main" val="0"/>
+              </a:ext>
+            </a:extLst>
+          </a:blip>
+          <a:srcRect/>
+          <a:stretch>
+            <a:fillRect/>
+          </a:stretch>
+        </p:blipFill>
+        <p:spPr bwMode="auto">
+          <a:xfrm>
+            <a:off x="11182350" y="5848350"/>
+            <a:ext cx="1009650" cy="1009650"/>
+          </a:xfrm>
+          <a:prstGeom prst="rect">
+            <a:avLst/>
+          </a:prstGeom>
+          <a:noFill/>
+          <a:extLst>
+            <a:ext uri="{909E8E84-426E-40DD-AFC4-6F175D3DCCD1}">
+              <a14:hiddenFill xmlns:a14="http://schemas.microsoft.com/office/drawing/2010/main">
+                <a:solidFill>
+                  <a:srgbClr val="FFFFFF"/>
+                </a:solidFill>
+              </a14:hiddenFill>
+            </a:ext>
+          </a:extLst>
+        </p:spPr>
+      </p:pic>
+      <p:pic>
+        <p:nvPicPr>
+          <p:cNvPr id="8" name="Picture 7">
+            <a:extLst>
+              <a:ext uri="{FF2B5EF4-FFF2-40B4-BE49-F238E27FC236}">
+                <a16:creationId xmlns:a16="http://schemas.microsoft.com/office/drawing/2014/main" id="{5A94F403-93A2-5405-E673-A3B5A186DAC9}"/>
+              </a:ext>
+            </a:extLst>
+          </p:cNvPr>
+          <p:cNvPicPr>
+            <a:picLocks noChangeAspect="1"/>
+          </p:cNvPicPr>
+          <p:nvPr/>
+        </p:nvPicPr>
+        <p:blipFill>
+          <a:blip r:embed="rId3"/>
+          <a:stretch>
+            <a:fillRect/>
+          </a:stretch>
+        </p:blipFill>
+        <p:spPr>
+          <a:xfrm>
+            <a:off x="2832167" y="1790217"/>
+            <a:ext cx="6527666" cy="3277565"/>
+          </a:xfrm>
+          <a:prstGeom prst="rect">
+            <a:avLst/>
+          </a:prstGeom>
+        </p:spPr>
+      </p:pic>
+    </p:spTree>
+    <p:extLst>
+      <p:ext uri="{BB962C8B-B14F-4D97-AF65-F5344CB8AC3E}">
+        <p14:creationId xmlns:p14="http://schemas.microsoft.com/office/powerpoint/2010/main" val="1327095021"/>
+      </p:ext>
+    </p:extLst>
+  </p:cSld>
+  <p:clrMapOvr>
+    <a:masterClrMapping/>
+  </p:clrMapOvr>
+</p:sld>
+</file>
+
+<file path=ppt/slides/slide20.xml><?xml version="1.0" encoding="utf-8"?>
 <p:sld xmlns:a="http://schemas.openxmlformats.org/drawingml/2006/main" xmlns:r="http://schemas.openxmlformats.org/officeDocument/2006/relationships" xmlns:p="http://schemas.openxmlformats.org/presentationml/2006/main">
   <p:cSld>
     <p:spTree>
@@ -8888,213 +9588,7 @@
 </p:sld>
 </file>
 
-<file path=ppt/slides/slide2.xml><?xml version="1.0" encoding="utf-8"?>
-<p:sld xmlns:a="http://schemas.openxmlformats.org/drawingml/2006/main" xmlns:r="http://schemas.openxmlformats.org/officeDocument/2006/relationships" xmlns:p="http://schemas.openxmlformats.org/presentationml/2006/main">
-  <p:cSld>
-    <p:spTree>
-      <p:nvGrpSpPr>
-        <p:cNvPr id="1" name=""/>
-        <p:cNvGrpSpPr/>
-        <p:nvPr/>
-      </p:nvGrpSpPr>
-      <p:grpSpPr>
-        <a:xfrm>
-          <a:off x="0" y="0"/>
-          <a:ext cx="0" cy="0"/>
-          <a:chOff x="0" y="0"/>
-          <a:chExt cx="0" cy="0"/>
-        </a:xfrm>
-      </p:grpSpPr>
-      <p:sp>
-        <p:nvSpPr>
-          <p:cNvPr id="2" name="TextBox 1">
-            <a:extLst>
-              <a:ext uri="{FF2B5EF4-FFF2-40B4-BE49-F238E27FC236}">
-                <a16:creationId xmlns:a16="http://schemas.microsoft.com/office/drawing/2014/main" id="{15726383-B407-319E-030C-10F657ACC3A3}"/>
-              </a:ext>
-            </a:extLst>
-          </p:cNvPr>
-          <p:cNvSpPr txBox="1"/>
-          <p:nvPr/>
-        </p:nvSpPr>
-        <p:spPr>
-          <a:xfrm>
-            <a:off x="0" y="323165"/>
-            <a:ext cx="12192000" cy="646331"/>
-          </a:xfrm>
-          <a:prstGeom prst="rect">
-            <a:avLst/>
-          </a:prstGeom>
-          <a:noFill/>
-        </p:spPr>
-        <p:txBody>
-          <a:bodyPr wrap="square" rtlCol="0">
-            <a:spAutoFit/>
-          </a:bodyPr>
-          <a:lstStyle/>
-          <a:p>
-            <a:pPr algn="ctr"/>
-            <a:r>
-              <a:rPr lang="en-US" sz="3600" i="1" dirty="0">
-                <a:solidFill>
-                  <a:srgbClr val="7030A0"/>
-                </a:solidFill>
-                <a:latin typeface="Calisto MT" panose="02040603050505030304" pitchFamily="18" charset="0"/>
-              </a:rPr>
-              <a:t>Business Requirements Definition</a:t>
-            </a:r>
-          </a:p>
-        </p:txBody>
-      </p:sp>
-      <p:pic>
-        <p:nvPicPr>
-          <p:cNvPr id="2050" name="Picture 2" descr="FIRN Analytics: Timely Data Solutions &amp; Expert Consultancy">
-            <a:extLst>
-              <a:ext uri="{FF2B5EF4-FFF2-40B4-BE49-F238E27FC236}">
-                <a16:creationId xmlns:a16="http://schemas.microsoft.com/office/drawing/2014/main" id="{14A52F25-2DAE-5DA7-4039-D4DC6699D305}"/>
-              </a:ext>
-            </a:extLst>
-          </p:cNvPr>
-          <p:cNvPicPr>
-            <a:picLocks noChangeAspect="1" noChangeArrowheads="1"/>
-          </p:cNvPicPr>
-          <p:nvPr/>
-        </p:nvPicPr>
-        <p:blipFill>
-          <a:blip r:embed="rId2">
-            <a:extLst>
-              <a:ext uri="{28A0092B-C50C-407E-A947-70E740481C1C}">
-                <a14:useLocalDpi xmlns:a14="http://schemas.microsoft.com/office/drawing/2010/main" val="0"/>
-              </a:ext>
-            </a:extLst>
-          </a:blip>
-          <a:srcRect/>
-          <a:stretch>
-            <a:fillRect/>
-          </a:stretch>
-        </p:blipFill>
-        <p:spPr bwMode="auto">
-          <a:xfrm>
-            <a:off x="11182350" y="5848350"/>
-            <a:ext cx="1009650" cy="1009650"/>
-          </a:xfrm>
-          <a:prstGeom prst="rect">
-            <a:avLst/>
-          </a:prstGeom>
-          <a:noFill/>
-          <a:extLst>
-            <a:ext uri="{909E8E84-426E-40DD-AFC4-6F175D3DCCD1}">
-              <a14:hiddenFill xmlns:a14="http://schemas.microsoft.com/office/drawing/2010/main">
-                <a:solidFill>
-                  <a:srgbClr val="FFFFFF"/>
-                </a:solidFill>
-              </a14:hiddenFill>
-            </a:ext>
-          </a:extLst>
-        </p:spPr>
-      </p:pic>
-      <p:grpSp>
-        <p:nvGrpSpPr>
-          <p:cNvPr id="8" name="Group 7">
-            <a:extLst>
-              <a:ext uri="{FF2B5EF4-FFF2-40B4-BE49-F238E27FC236}">
-                <a16:creationId xmlns:a16="http://schemas.microsoft.com/office/drawing/2014/main" id="{AC40E9C4-C06E-D8A3-AADA-DF53598EB866}"/>
-              </a:ext>
-            </a:extLst>
-          </p:cNvPr>
-          <p:cNvGrpSpPr/>
-          <p:nvPr/>
-        </p:nvGrpSpPr>
-        <p:grpSpPr>
-          <a:xfrm>
-            <a:off x="2751666" y="1678659"/>
-            <a:ext cx="6608167" cy="3389123"/>
-            <a:chOff x="2751666" y="1678659"/>
-            <a:chExt cx="6608167" cy="3389123"/>
-          </a:xfrm>
-        </p:grpSpPr>
-        <p:pic>
-          <p:nvPicPr>
-            <p:cNvPr id="5" name="Picture 4">
-              <a:extLst>
-                <a:ext uri="{FF2B5EF4-FFF2-40B4-BE49-F238E27FC236}">
-                  <a16:creationId xmlns:a16="http://schemas.microsoft.com/office/drawing/2014/main" id="{F223CCC0-1664-72B9-1170-0B4D430ABE91}"/>
-                </a:ext>
-              </a:extLst>
-            </p:cNvPr>
-            <p:cNvPicPr>
-              <a:picLocks noChangeAspect="1"/>
-            </p:cNvPicPr>
-            <p:nvPr/>
-          </p:nvPicPr>
-          <p:blipFill>
-            <a:blip r:embed="rId3"/>
-            <a:stretch>
-              <a:fillRect/>
-            </a:stretch>
-          </p:blipFill>
-          <p:spPr>
-            <a:xfrm>
-              <a:off x="2832167" y="1790217"/>
-              <a:ext cx="6527666" cy="3277565"/>
-            </a:xfrm>
-            <a:prstGeom prst="rect">
-              <a:avLst/>
-            </a:prstGeom>
-          </p:spPr>
-        </p:pic>
-        <p:sp>
-          <p:nvSpPr>
-            <p:cNvPr id="7" name="TextBox 6">
-              <a:extLst>
-                <a:ext uri="{FF2B5EF4-FFF2-40B4-BE49-F238E27FC236}">
-                  <a16:creationId xmlns:a16="http://schemas.microsoft.com/office/drawing/2014/main" id="{DFF79EFA-CA38-582E-F01A-8D06F5981F3B}"/>
-                </a:ext>
-              </a:extLst>
-            </p:cNvPr>
-            <p:cNvSpPr txBox="1"/>
-            <p:nvPr/>
-          </p:nvSpPr>
-          <p:spPr>
-            <a:xfrm>
-              <a:off x="2751666" y="1678659"/>
-              <a:ext cx="1303869" cy="3299742"/>
-            </a:xfrm>
-            <a:prstGeom prst="rect">
-              <a:avLst/>
-            </a:prstGeom>
-            <a:noFill/>
-            <a:ln w="38100">
-              <a:solidFill>
-                <a:srgbClr val="7030A0"/>
-              </a:solidFill>
-            </a:ln>
-          </p:spPr>
-          <p:txBody>
-            <a:bodyPr wrap="square" rtlCol="0">
-              <a:spAutoFit/>
-            </a:bodyPr>
-            <a:lstStyle/>
-            <a:p>
-              <a:endParaRPr lang="en-US" dirty="0"/>
-            </a:p>
-          </p:txBody>
-        </p:sp>
-      </p:grpSp>
-    </p:spTree>
-    <p:extLst>
-      <p:ext uri="{BB962C8B-B14F-4D97-AF65-F5344CB8AC3E}">
-        <p14:creationId xmlns:p14="http://schemas.microsoft.com/office/powerpoint/2010/main" val="2085280596"/>
-      </p:ext>
-    </p:extLst>
-  </p:cSld>
-  <p:clrMapOvr>
-    <a:masterClrMapping/>
-  </p:clrMapOvr>
-</p:sld>
-</file>
-
-<file path=ppt/slides/slide20.xml><?xml version="1.0" encoding="utf-8"?>
+<file path=ppt/slides/slide21.xml><?xml version="1.0" encoding="utf-8"?>
 <p:sld xmlns:a="http://schemas.openxmlformats.org/drawingml/2006/main" xmlns:r="http://schemas.openxmlformats.org/officeDocument/2006/relationships" xmlns:p="http://schemas.openxmlformats.org/presentationml/2006/main">
   <p:cSld>
     <p:spTree>
@@ -9500,7 +9994,7 @@
 </p:sld>
 </file>
 
-<file path=ppt/slides/slide21.xml><?xml version="1.0" encoding="utf-8"?>
+<file path=ppt/slides/slide22.xml><?xml version="1.0" encoding="utf-8"?>
 <p:sld xmlns:a="http://schemas.openxmlformats.org/drawingml/2006/main" xmlns:r="http://schemas.openxmlformats.org/officeDocument/2006/relationships" xmlns:p="http://schemas.openxmlformats.org/presentationml/2006/main">
   <p:cSld>
     <p:spTree>
@@ -9706,7 +10200,7 @@
 </p:sld>
 </file>
 
-<file path=ppt/slides/slide22.xml><?xml version="1.0" encoding="utf-8"?>
+<file path=ppt/slides/slide23.xml><?xml version="1.0" encoding="utf-8"?>
 <p:sld xmlns:a="http://schemas.openxmlformats.org/drawingml/2006/main" xmlns:r="http://schemas.openxmlformats.org/officeDocument/2006/relationships" xmlns:p="http://schemas.openxmlformats.org/presentationml/2006/main">
   <p:cSld>
     <p:spTree>
@@ -10560,7 +11054,7 @@
 </p:sld>
 </file>
 
-<file path=ppt/slides/slide23.xml><?xml version="1.0" encoding="utf-8"?>
+<file path=ppt/slides/slide24.xml><?xml version="1.0" encoding="utf-8"?>
 <p:sld xmlns:a="http://schemas.openxmlformats.org/drawingml/2006/main" xmlns:r="http://schemas.openxmlformats.org/officeDocument/2006/relationships" xmlns:p="http://schemas.openxmlformats.org/presentationml/2006/main">
   <p:cSld>
     <p:spTree>
@@ -10755,7 +11249,2145 @@
 </p:sld>
 </file>
 
+<file path=ppt/slides/slide25.xml><?xml version="1.0" encoding="utf-8"?>
+<p:sld xmlns:a="http://schemas.openxmlformats.org/drawingml/2006/main" xmlns:r="http://schemas.openxmlformats.org/officeDocument/2006/relationships" xmlns:p="http://schemas.openxmlformats.org/presentationml/2006/main">
+  <p:cSld>
+    <p:spTree>
+      <p:nvGrpSpPr>
+        <p:cNvPr id="1" name=""/>
+        <p:cNvGrpSpPr/>
+        <p:nvPr/>
+      </p:nvGrpSpPr>
+      <p:grpSpPr>
+        <a:xfrm>
+          <a:off x="0" y="0"/>
+          <a:ext cx="0" cy="0"/>
+          <a:chOff x="0" y="0"/>
+          <a:chExt cx="0" cy="0"/>
+        </a:xfrm>
+      </p:grpSpPr>
+      <p:sp>
+        <p:nvSpPr>
+          <p:cNvPr id="2" name="TextBox 1">
+            <a:extLst>
+              <a:ext uri="{FF2B5EF4-FFF2-40B4-BE49-F238E27FC236}">
+                <a16:creationId xmlns:a16="http://schemas.microsoft.com/office/drawing/2014/main" id="{15726383-B407-319E-030C-10F657ACC3A3}"/>
+              </a:ext>
+            </a:extLst>
+          </p:cNvPr>
+          <p:cNvSpPr txBox="1"/>
+          <p:nvPr/>
+        </p:nvSpPr>
+        <p:spPr>
+          <a:xfrm>
+            <a:off x="0" y="323165"/>
+            <a:ext cx="12192000" cy="646331"/>
+          </a:xfrm>
+          <a:prstGeom prst="rect">
+            <a:avLst/>
+          </a:prstGeom>
+          <a:noFill/>
+        </p:spPr>
+        <p:txBody>
+          <a:bodyPr wrap="square" rtlCol="0">
+            <a:spAutoFit/>
+          </a:bodyPr>
+          <a:lstStyle/>
+          <a:p>
+            <a:pPr algn="ctr"/>
+            <a:r>
+              <a:rPr lang="en-US" sz="3600" i="1" dirty="0">
+                <a:solidFill>
+                  <a:srgbClr val="7030A0"/>
+                </a:solidFill>
+                <a:latin typeface="Calisto MT" panose="02040603050505030304" pitchFamily="18" charset="0"/>
+              </a:rPr>
+              <a:t>Further Considerations – Dimensional Model</a:t>
+            </a:r>
+          </a:p>
+        </p:txBody>
+      </p:sp>
+      <p:pic>
+        <p:nvPicPr>
+          <p:cNvPr id="28" name="Picture 2" descr="FIRN Analytics: Timely Data Solutions &amp; Expert Consultancy">
+            <a:extLst>
+              <a:ext uri="{FF2B5EF4-FFF2-40B4-BE49-F238E27FC236}">
+                <a16:creationId xmlns:a16="http://schemas.microsoft.com/office/drawing/2014/main" id="{EDAB711B-E37E-D69B-1D15-6F86217E9CDE}"/>
+              </a:ext>
+            </a:extLst>
+          </p:cNvPr>
+          <p:cNvPicPr>
+            <a:picLocks noChangeAspect="1" noChangeArrowheads="1"/>
+          </p:cNvPicPr>
+          <p:nvPr/>
+        </p:nvPicPr>
+        <p:blipFill>
+          <a:blip r:embed="rId2">
+            <a:extLst>
+              <a:ext uri="{28A0092B-C50C-407E-A947-70E740481C1C}">
+                <a14:useLocalDpi xmlns:a14="http://schemas.microsoft.com/office/drawing/2010/main" val="0"/>
+              </a:ext>
+            </a:extLst>
+          </a:blip>
+          <a:srcRect/>
+          <a:stretch>
+            <a:fillRect/>
+          </a:stretch>
+        </p:blipFill>
+        <p:spPr bwMode="auto">
+          <a:xfrm>
+            <a:off x="11182350" y="5848350"/>
+            <a:ext cx="1009650" cy="1009650"/>
+          </a:xfrm>
+          <a:prstGeom prst="rect">
+            <a:avLst/>
+          </a:prstGeom>
+          <a:noFill/>
+          <a:extLst>
+            <a:ext uri="{909E8E84-426E-40DD-AFC4-6F175D3DCCD1}">
+              <a14:hiddenFill xmlns:a14="http://schemas.microsoft.com/office/drawing/2010/main">
+                <a:solidFill>
+                  <a:srgbClr val="FFFFFF"/>
+                </a:solidFill>
+              </a14:hiddenFill>
+            </a:ext>
+          </a:extLst>
+        </p:spPr>
+      </p:pic>
+      <p:grpSp>
+        <p:nvGrpSpPr>
+          <p:cNvPr id="8" name="Group 7">
+            <a:extLst>
+              <a:ext uri="{FF2B5EF4-FFF2-40B4-BE49-F238E27FC236}">
+                <a16:creationId xmlns:a16="http://schemas.microsoft.com/office/drawing/2014/main" id="{B2A0204C-1E96-3F9A-8CB0-A08E0EFD4250}"/>
+              </a:ext>
+            </a:extLst>
+          </p:cNvPr>
+          <p:cNvGrpSpPr/>
+          <p:nvPr/>
+        </p:nvGrpSpPr>
+        <p:grpSpPr>
+          <a:xfrm>
+            <a:off x="378736" y="2229207"/>
+            <a:ext cx="11152194" cy="3408701"/>
+            <a:chOff x="378736" y="2229207"/>
+            <a:chExt cx="11152194" cy="3408701"/>
+          </a:xfrm>
+        </p:grpSpPr>
+        <p:grpSp>
+          <p:nvGrpSpPr>
+            <p:cNvPr id="24" name="Group 23">
+              <a:extLst>
+                <a:ext uri="{FF2B5EF4-FFF2-40B4-BE49-F238E27FC236}">
+                  <a16:creationId xmlns:a16="http://schemas.microsoft.com/office/drawing/2014/main" id="{429763CD-930D-48F6-FAB2-0186080042F7}"/>
+                </a:ext>
+              </a:extLst>
+            </p:cNvPr>
+            <p:cNvGrpSpPr/>
+            <p:nvPr/>
+          </p:nvGrpSpPr>
+          <p:grpSpPr>
+            <a:xfrm>
+              <a:off x="378736" y="2233749"/>
+              <a:ext cx="11152194" cy="3388784"/>
+              <a:chOff x="420681" y="2812676"/>
+              <a:chExt cx="11152194" cy="3388784"/>
+            </a:xfrm>
+          </p:grpSpPr>
+          <p:grpSp>
+            <p:nvGrpSpPr>
+              <p:cNvPr id="21" name="Group 20">
+                <a:extLst>
+                  <a:ext uri="{FF2B5EF4-FFF2-40B4-BE49-F238E27FC236}">
+                    <a16:creationId xmlns:a16="http://schemas.microsoft.com/office/drawing/2014/main" id="{6091815F-AD39-5837-9DC0-0AA03DD9250D}"/>
+                  </a:ext>
+                </a:extLst>
+              </p:cNvPr>
+              <p:cNvGrpSpPr/>
+              <p:nvPr/>
+            </p:nvGrpSpPr>
+            <p:grpSpPr>
+              <a:xfrm>
+                <a:off x="420681" y="2812676"/>
+                <a:ext cx="11152194" cy="3388784"/>
+                <a:chOff x="420681" y="2812676"/>
+                <a:chExt cx="11152194" cy="3388784"/>
+              </a:xfrm>
+            </p:grpSpPr>
+            <p:pic>
+              <p:nvPicPr>
+                <p:cNvPr id="5" name="Picture 4">
+                  <a:extLst>
+                    <a:ext uri="{FF2B5EF4-FFF2-40B4-BE49-F238E27FC236}">
+                      <a16:creationId xmlns:a16="http://schemas.microsoft.com/office/drawing/2014/main" id="{975A3B9B-5B1C-B85B-EE42-BC01D09AA0A1}"/>
+                    </a:ext>
+                  </a:extLst>
+                </p:cNvPr>
+                <p:cNvPicPr>
+                  <a:picLocks noChangeAspect="1"/>
+                </p:cNvPicPr>
+                <p:nvPr/>
+              </p:nvPicPr>
+              <p:blipFill>
+                <a:blip r:embed="rId3"/>
+                <a:stretch>
+                  <a:fillRect/>
+                </a:stretch>
+              </p:blipFill>
+              <p:spPr>
+                <a:xfrm>
+                  <a:off x="420681" y="4968813"/>
+                  <a:ext cx="5332419" cy="1232647"/>
+                </a:xfrm>
+                <a:prstGeom prst="rect">
+                  <a:avLst/>
+                </a:prstGeom>
+              </p:spPr>
+            </p:pic>
+            <p:cxnSp>
+              <p:nvCxnSpPr>
+                <p:cNvPr id="7" name="Straight Connector 6">
+                  <a:extLst>
+                    <a:ext uri="{FF2B5EF4-FFF2-40B4-BE49-F238E27FC236}">
+                      <a16:creationId xmlns:a16="http://schemas.microsoft.com/office/drawing/2014/main" id="{2AE019F7-31D9-2ECA-1EC0-ED67B6F00907}"/>
+                    </a:ext>
+                  </a:extLst>
+                </p:cNvPr>
+                <p:cNvCxnSpPr>
+                  <a:cxnSpLocks/>
+                </p:cNvCxnSpPr>
+                <p:nvPr/>
+              </p:nvCxnSpPr>
+              <p:spPr>
+                <a:xfrm>
+                  <a:off x="5753100" y="5127937"/>
+                  <a:ext cx="760686" cy="0"/>
+                </a:xfrm>
+                <a:prstGeom prst="line">
+                  <a:avLst/>
+                </a:prstGeom>
+                <a:ln w="19050" cap="flat" cmpd="sng" algn="ctr">
+                  <a:solidFill>
+                    <a:schemeClr val="accent6"/>
+                  </a:solidFill>
+                  <a:prstDash val="dash"/>
+                  <a:round/>
+                  <a:headEnd type="none" w="med" len="med"/>
+                  <a:tailEnd type="none" w="med" len="med"/>
+                </a:ln>
+              </p:spPr>
+              <p:style>
+                <a:lnRef idx="0">
+                  <a:scrgbClr r="0" g="0" b="0"/>
+                </a:lnRef>
+                <a:fillRef idx="0">
+                  <a:scrgbClr r="0" g="0" b="0"/>
+                </a:fillRef>
+                <a:effectRef idx="0">
+                  <a:scrgbClr r="0" g="0" b="0"/>
+                </a:effectRef>
+                <a:fontRef idx="minor">
+                  <a:schemeClr val="tx1"/>
+                </a:fontRef>
+              </p:style>
+            </p:cxnSp>
+            <p:pic>
+              <p:nvPicPr>
+                <p:cNvPr id="11" name="Picture 10">
+                  <a:extLst>
+                    <a:ext uri="{FF2B5EF4-FFF2-40B4-BE49-F238E27FC236}">
+                      <a16:creationId xmlns:a16="http://schemas.microsoft.com/office/drawing/2014/main" id="{0755CA8A-BCB8-4C07-33BA-58B3B81371AE}"/>
+                    </a:ext>
+                  </a:extLst>
+                </p:cNvPr>
+                <p:cNvPicPr>
+                  <a:picLocks noChangeAspect="1"/>
+                </p:cNvPicPr>
+                <p:nvPr/>
+              </p:nvPicPr>
+              <p:blipFill>
+                <a:blip r:embed="rId4"/>
+                <a:stretch>
+                  <a:fillRect/>
+                </a:stretch>
+              </p:blipFill>
+              <p:spPr>
+                <a:xfrm>
+                  <a:off x="6513786" y="4968813"/>
+                  <a:ext cx="5059089" cy="1232647"/>
+                </a:xfrm>
+                <a:prstGeom prst="rect">
+                  <a:avLst/>
+                </a:prstGeom>
+              </p:spPr>
+            </p:pic>
+            <p:pic>
+              <p:nvPicPr>
+                <p:cNvPr id="20" name="Picture 19">
+                  <a:extLst>
+                    <a:ext uri="{FF2B5EF4-FFF2-40B4-BE49-F238E27FC236}">
+                      <a16:creationId xmlns:a16="http://schemas.microsoft.com/office/drawing/2014/main" id="{7C188E88-9A8C-1E2E-335E-100519B809DA}"/>
+                    </a:ext>
+                  </a:extLst>
+                </p:cNvPr>
+                <p:cNvPicPr>
+                  <a:picLocks noChangeAspect="1"/>
+                </p:cNvPicPr>
+                <p:nvPr/>
+              </p:nvPicPr>
+              <p:blipFill>
+                <a:blip r:embed="rId5"/>
+                <a:stretch>
+                  <a:fillRect/>
+                </a:stretch>
+              </p:blipFill>
+              <p:spPr>
+                <a:xfrm>
+                  <a:off x="420681" y="2812676"/>
+                  <a:ext cx="5332419" cy="1232647"/>
+                </a:xfrm>
+                <a:prstGeom prst="rect">
+                  <a:avLst/>
+                </a:prstGeom>
+              </p:spPr>
+            </p:pic>
+            <p:cxnSp>
+              <p:nvCxnSpPr>
+                <p:cNvPr id="25" name="Straight Connector 24">
+                  <a:extLst>
+                    <a:ext uri="{FF2B5EF4-FFF2-40B4-BE49-F238E27FC236}">
+                      <a16:creationId xmlns:a16="http://schemas.microsoft.com/office/drawing/2014/main" id="{1C3F964F-6451-A3F9-8865-D0E9C46D858D}"/>
+                    </a:ext>
+                  </a:extLst>
+                </p:cNvPr>
+                <p:cNvCxnSpPr>
+                  <a:cxnSpLocks/>
+                </p:cNvCxnSpPr>
+                <p:nvPr/>
+              </p:nvCxnSpPr>
+              <p:spPr>
+                <a:xfrm>
+                  <a:off x="5753100" y="2956237"/>
+                  <a:ext cx="760686" cy="0"/>
+                </a:xfrm>
+                <a:prstGeom prst="line">
+                  <a:avLst/>
+                </a:prstGeom>
+                <a:ln w="19050" cap="flat" cmpd="sng" algn="ctr">
+                  <a:solidFill>
+                    <a:srgbClr val="0000FF"/>
+                  </a:solidFill>
+                  <a:prstDash val="dash"/>
+                  <a:round/>
+                  <a:headEnd type="none" w="med" len="med"/>
+                  <a:tailEnd type="none" w="med" len="med"/>
+                </a:ln>
+              </p:spPr>
+              <p:style>
+                <a:lnRef idx="0">
+                  <a:scrgbClr r="0" g="0" b="0"/>
+                </a:lnRef>
+                <a:fillRef idx="0">
+                  <a:scrgbClr r="0" g="0" b="0"/>
+                </a:fillRef>
+                <a:effectRef idx="0">
+                  <a:scrgbClr r="0" g="0" b="0"/>
+                </a:effectRef>
+                <a:fontRef idx="minor">
+                  <a:schemeClr val="tx1"/>
+                </a:fontRef>
+              </p:style>
+            </p:cxnSp>
+          </p:grpSp>
+          <p:pic>
+            <p:nvPicPr>
+              <p:cNvPr id="23" name="Picture 22">
+                <a:extLst>
+                  <a:ext uri="{FF2B5EF4-FFF2-40B4-BE49-F238E27FC236}">
+                    <a16:creationId xmlns:a16="http://schemas.microsoft.com/office/drawing/2014/main" id="{0051B3AF-03CD-6C37-E271-2E63AEB6DBF9}"/>
+                  </a:ext>
+                </a:extLst>
+              </p:cNvPr>
+              <p:cNvPicPr>
+                <a:picLocks noChangeAspect="1"/>
+              </p:cNvPicPr>
+              <p:nvPr/>
+            </p:nvPicPr>
+            <p:blipFill>
+              <a:blip r:embed="rId6"/>
+              <a:stretch>
+                <a:fillRect/>
+              </a:stretch>
+            </p:blipFill>
+            <p:spPr>
+              <a:xfrm>
+                <a:off x="6513786" y="2812676"/>
+                <a:ext cx="5059089" cy="1232647"/>
+              </a:xfrm>
+              <a:prstGeom prst="rect">
+                <a:avLst/>
+              </a:prstGeom>
+            </p:spPr>
+          </p:pic>
+        </p:grpSp>
+        <p:sp>
+          <p:nvSpPr>
+            <p:cNvPr id="4" name="TextBox 3">
+              <a:extLst>
+                <a:ext uri="{FF2B5EF4-FFF2-40B4-BE49-F238E27FC236}">
+                  <a16:creationId xmlns:a16="http://schemas.microsoft.com/office/drawing/2014/main" id="{5DC00F5B-FED9-10F3-4F5B-1EDD755868D8}"/>
+                </a:ext>
+              </a:extLst>
+            </p:cNvPr>
+            <p:cNvSpPr txBox="1"/>
+            <p:nvPr/>
+          </p:nvSpPr>
+          <p:spPr>
+            <a:xfrm>
+              <a:off x="1735645" y="4404380"/>
+              <a:ext cx="2702131" cy="1222695"/>
+            </a:xfrm>
+            <a:prstGeom prst="rect">
+              <a:avLst/>
+            </a:prstGeom>
+            <a:noFill/>
+            <a:ln w="38100">
+              <a:solidFill>
+                <a:schemeClr val="bg1">
+                  <a:lumMod val="65000"/>
+                </a:schemeClr>
+              </a:solidFill>
+            </a:ln>
+          </p:spPr>
+          <p:txBody>
+            <a:bodyPr wrap="square" rtlCol="0">
+              <a:spAutoFit/>
+            </a:bodyPr>
+            <a:lstStyle/>
+            <a:p>
+              <a:endParaRPr lang="en-US" dirty="0"/>
+            </a:p>
+          </p:txBody>
+        </p:sp>
+        <p:sp>
+          <p:nvSpPr>
+            <p:cNvPr id="6" name="TextBox 5">
+              <a:extLst>
+                <a:ext uri="{FF2B5EF4-FFF2-40B4-BE49-F238E27FC236}">
+                  <a16:creationId xmlns:a16="http://schemas.microsoft.com/office/drawing/2014/main" id="{C780FA93-B02F-4424-B867-C31B7CCAE3A1}"/>
+                </a:ext>
+              </a:extLst>
+            </p:cNvPr>
+            <p:cNvSpPr txBox="1"/>
+            <p:nvPr/>
+          </p:nvSpPr>
+          <p:spPr>
+            <a:xfrm>
+              <a:off x="2012482" y="2229207"/>
+              <a:ext cx="3698673" cy="1222695"/>
+            </a:xfrm>
+            <a:prstGeom prst="rect">
+              <a:avLst/>
+            </a:prstGeom>
+            <a:noFill/>
+            <a:ln w="38100">
+              <a:solidFill>
+                <a:schemeClr val="accent6">
+                  <a:lumMod val="50000"/>
+                </a:schemeClr>
+              </a:solidFill>
+            </a:ln>
+          </p:spPr>
+          <p:txBody>
+            <a:bodyPr wrap="square" rtlCol="0">
+              <a:spAutoFit/>
+            </a:bodyPr>
+            <a:lstStyle/>
+            <a:p>
+              <a:endParaRPr lang="en-US" dirty="0"/>
+            </a:p>
+          </p:txBody>
+        </p:sp>
+        <p:sp>
+          <p:nvSpPr>
+            <p:cNvPr id="9" name="TextBox 8">
+              <a:extLst>
+                <a:ext uri="{FF2B5EF4-FFF2-40B4-BE49-F238E27FC236}">
+                  <a16:creationId xmlns:a16="http://schemas.microsoft.com/office/drawing/2014/main" id="{EAB9E6CB-6008-A4A2-2A47-9FCDF25D757B}"/>
+                </a:ext>
+              </a:extLst>
+            </p:cNvPr>
+            <p:cNvSpPr txBox="1"/>
+            <p:nvPr/>
+          </p:nvSpPr>
+          <p:spPr>
+            <a:xfrm>
+              <a:off x="6399925" y="4389886"/>
+              <a:ext cx="668140" cy="1222695"/>
+            </a:xfrm>
+            <a:prstGeom prst="rect">
+              <a:avLst/>
+            </a:prstGeom>
+            <a:noFill/>
+            <a:ln w="38100">
+              <a:solidFill>
+                <a:srgbClr val="7030A0"/>
+              </a:solidFill>
+            </a:ln>
+          </p:spPr>
+          <p:txBody>
+            <a:bodyPr wrap="square" rtlCol="0">
+              <a:spAutoFit/>
+            </a:bodyPr>
+            <a:lstStyle/>
+            <a:p>
+              <a:endParaRPr lang="en-US" dirty="0"/>
+            </a:p>
+          </p:txBody>
+        </p:sp>
+        <p:sp>
+          <p:nvSpPr>
+            <p:cNvPr id="10" name="TextBox 9">
+              <a:extLst>
+                <a:ext uri="{FF2B5EF4-FFF2-40B4-BE49-F238E27FC236}">
+                  <a16:creationId xmlns:a16="http://schemas.microsoft.com/office/drawing/2014/main" id="{D57B250E-7B83-1C4D-D66A-DB45FECEE2D9}"/>
+                </a:ext>
+              </a:extLst>
+            </p:cNvPr>
+            <p:cNvSpPr txBox="1"/>
+            <p:nvPr/>
+          </p:nvSpPr>
+          <p:spPr>
+            <a:xfrm>
+              <a:off x="4570125" y="4404380"/>
+              <a:ext cx="1212947" cy="1222695"/>
+            </a:xfrm>
+            <a:prstGeom prst="rect">
+              <a:avLst/>
+            </a:prstGeom>
+            <a:noFill/>
+            <a:ln w="38100">
+              <a:solidFill>
+                <a:srgbClr val="663300"/>
+              </a:solidFill>
+            </a:ln>
+          </p:spPr>
+          <p:txBody>
+            <a:bodyPr wrap="square" rtlCol="0">
+              <a:spAutoFit/>
+            </a:bodyPr>
+            <a:lstStyle/>
+            <a:p>
+              <a:endParaRPr lang="en-US" dirty="0"/>
+            </a:p>
+          </p:txBody>
+        </p:sp>
+        <p:sp>
+          <p:nvSpPr>
+            <p:cNvPr id="12" name="TextBox 11">
+              <a:extLst>
+                <a:ext uri="{FF2B5EF4-FFF2-40B4-BE49-F238E27FC236}">
+                  <a16:creationId xmlns:a16="http://schemas.microsoft.com/office/drawing/2014/main" id="{8300D34B-EF90-50CD-9F18-501ECAA34F84}"/>
+                </a:ext>
+              </a:extLst>
+            </p:cNvPr>
+            <p:cNvSpPr txBox="1"/>
+            <p:nvPr/>
+          </p:nvSpPr>
+          <p:spPr>
+            <a:xfrm>
+              <a:off x="6480847" y="2244582"/>
+              <a:ext cx="5050083" cy="1222695"/>
+            </a:xfrm>
+            <a:prstGeom prst="rect">
+              <a:avLst/>
+            </a:prstGeom>
+            <a:noFill/>
+            <a:ln w="38100">
+              <a:solidFill>
+                <a:schemeClr val="accent1"/>
+              </a:solidFill>
+            </a:ln>
+          </p:spPr>
+          <p:txBody>
+            <a:bodyPr wrap="square" rtlCol="0">
+              <a:spAutoFit/>
+            </a:bodyPr>
+            <a:lstStyle/>
+            <a:p>
+              <a:endParaRPr lang="en-US" dirty="0"/>
+            </a:p>
+          </p:txBody>
+        </p:sp>
+        <p:sp>
+          <p:nvSpPr>
+            <p:cNvPr id="13" name="TextBox 12">
+              <a:extLst>
+                <a:ext uri="{FF2B5EF4-FFF2-40B4-BE49-F238E27FC236}">
+                  <a16:creationId xmlns:a16="http://schemas.microsoft.com/office/drawing/2014/main" id="{C41C16CB-9C35-D7FB-A651-4B96F492D7DA}"/>
+                </a:ext>
+              </a:extLst>
+            </p:cNvPr>
+            <p:cNvSpPr txBox="1"/>
+            <p:nvPr/>
+          </p:nvSpPr>
+          <p:spPr>
+            <a:xfrm>
+              <a:off x="7160610" y="4415213"/>
+              <a:ext cx="1471662" cy="1222695"/>
+            </a:xfrm>
+            <a:prstGeom prst="rect">
+              <a:avLst/>
+            </a:prstGeom>
+            <a:noFill/>
+            <a:ln w="38100">
+              <a:solidFill>
+                <a:schemeClr val="accent2"/>
+              </a:solidFill>
+            </a:ln>
+          </p:spPr>
+          <p:txBody>
+            <a:bodyPr wrap="square" rtlCol="0">
+              <a:spAutoFit/>
+            </a:bodyPr>
+            <a:lstStyle/>
+            <a:p>
+              <a:endParaRPr lang="en-US" dirty="0"/>
+            </a:p>
+          </p:txBody>
+        </p:sp>
+        <p:sp>
+          <p:nvSpPr>
+            <p:cNvPr id="14" name="TextBox 13">
+              <a:extLst>
+                <a:ext uri="{FF2B5EF4-FFF2-40B4-BE49-F238E27FC236}">
+                  <a16:creationId xmlns:a16="http://schemas.microsoft.com/office/drawing/2014/main" id="{59BFCD23-6232-6596-FC61-A8E8A0B566E2}"/>
+                </a:ext>
+              </a:extLst>
+            </p:cNvPr>
+            <p:cNvSpPr txBox="1"/>
+            <p:nvPr/>
+          </p:nvSpPr>
+          <p:spPr>
+            <a:xfrm>
+              <a:off x="8734950" y="4399838"/>
+              <a:ext cx="2795980" cy="1222695"/>
+            </a:xfrm>
+            <a:prstGeom prst="rect">
+              <a:avLst/>
+            </a:prstGeom>
+            <a:noFill/>
+            <a:ln w="38100">
+              <a:solidFill>
+                <a:srgbClr val="C00000"/>
+              </a:solidFill>
+            </a:ln>
+          </p:spPr>
+          <p:txBody>
+            <a:bodyPr wrap="square" rtlCol="0">
+              <a:spAutoFit/>
+            </a:bodyPr>
+            <a:lstStyle/>
+            <a:p>
+              <a:endParaRPr lang="en-US" dirty="0"/>
+            </a:p>
+          </p:txBody>
+        </p:sp>
+      </p:grpSp>
+    </p:spTree>
+    <p:extLst>
+      <p:ext uri="{BB962C8B-B14F-4D97-AF65-F5344CB8AC3E}">
+        <p14:creationId xmlns:p14="http://schemas.microsoft.com/office/powerpoint/2010/main" val="3164976997"/>
+      </p:ext>
+    </p:extLst>
+  </p:cSld>
+  <p:clrMapOvr>
+    <a:masterClrMapping/>
+  </p:clrMapOvr>
+</p:sld>
+</file>
+
+<file path=ppt/slides/slide26.xml><?xml version="1.0" encoding="utf-8"?>
+<p:sld xmlns:a="http://schemas.openxmlformats.org/drawingml/2006/main" xmlns:r="http://schemas.openxmlformats.org/officeDocument/2006/relationships" xmlns:p="http://schemas.openxmlformats.org/presentationml/2006/main">
+  <p:cSld>
+    <p:spTree>
+      <p:nvGrpSpPr>
+        <p:cNvPr id="1" name=""/>
+        <p:cNvGrpSpPr/>
+        <p:nvPr/>
+      </p:nvGrpSpPr>
+      <p:grpSpPr>
+        <a:xfrm>
+          <a:off x="0" y="0"/>
+          <a:ext cx="0" cy="0"/>
+          <a:chOff x="0" y="0"/>
+          <a:chExt cx="0" cy="0"/>
+        </a:xfrm>
+      </p:grpSpPr>
+      <p:sp>
+        <p:nvSpPr>
+          <p:cNvPr id="2" name="TextBox 1">
+            <a:extLst>
+              <a:ext uri="{FF2B5EF4-FFF2-40B4-BE49-F238E27FC236}">
+                <a16:creationId xmlns:a16="http://schemas.microsoft.com/office/drawing/2014/main" id="{15726383-B407-319E-030C-10F657ACC3A3}"/>
+              </a:ext>
+            </a:extLst>
+          </p:cNvPr>
+          <p:cNvSpPr txBox="1"/>
+          <p:nvPr/>
+        </p:nvSpPr>
+        <p:spPr>
+          <a:xfrm>
+            <a:off x="0" y="323165"/>
+            <a:ext cx="12192000" cy="646331"/>
+          </a:xfrm>
+          <a:prstGeom prst="rect">
+            <a:avLst/>
+          </a:prstGeom>
+          <a:noFill/>
+        </p:spPr>
+        <p:txBody>
+          <a:bodyPr wrap="square" rtlCol="0">
+            <a:spAutoFit/>
+          </a:bodyPr>
+          <a:lstStyle/>
+          <a:p>
+            <a:pPr algn="ctr"/>
+            <a:r>
+              <a:rPr lang="en-US" sz="3600" i="1" dirty="0">
+                <a:solidFill>
+                  <a:srgbClr val="7030A0"/>
+                </a:solidFill>
+                <a:latin typeface="Calisto MT" panose="02040603050505030304" pitchFamily="18" charset="0"/>
+              </a:rPr>
+              <a:t>Further Considerations – Dimensional Model</a:t>
+            </a:r>
+          </a:p>
+        </p:txBody>
+      </p:sp>
+      <p:pic>
+        <p:nvPicPr>
+          <p:cNvPr id="2050" name="Picture 2" descr="FIRN Analytics: Timely Data Solutions &amp; Expert Consultancy">
+            <a:extLst>
+              <a:ext uri="{FF2B5EF4-FFF2-40B4-BE49-F238E27FC236}">
+                <a16:creationId xmlns:a16="http://schemas.microsoft.com/office/drawing/2014/main" id="{14A52F25-2DAE-5DA7-4039-D4DC6699D305}"/>
+              </a:ext>
+            </a:extLst>
+          </p:cNvPr>
+          <p:cNvPicPr>
+            <a:picLocks noChangeAspect="1" noChangeArrowheads="1"/>
+          </p:cNvPicPr>
+          <p:nvPr/>
+        </p:nvPicPr>
+        <p:blipFill>
+          <a:blip r:embed="rId2">
+            <a:extLst>
+              <a:ext uri="{28A0092B-C50C-407E-A947-70E740481C1C}">
+                <a14:useLocalDpi xmlns:a14="http://schemas.microsoft.com/office/drawing/2010/main" val="0"/>
+              </a:ext>
+            </a:extLst>
+          </a:blip>
+          <a:srcRect/>
+          <a:stretch>
+            <a:fillRect/>
+          </a:stretch>
+        </p:blipFill>
+        <p:spPr bwMode="auto">
+          <a:xfrm>
+            <a:off x="11182350" y="5848350"/>
+            <a:ext cx="1009650" cy="1009650"/>
+          </a:xfrm>
+          <a:prstGeom prst="rect">
+            <a:avLst/>
+          </a:prstGeom>
+          <a:noFill/>
+          <a:extLst>
+            <a:ext uri="{909E8E84-426E-40DD-AFC4-6F175D3DCCD1}">
+              <a14:hiddenFill xmlns:a14="http://schemas.microsoft.com/office/drawing/2010/main">
+                <a:solidFill>
+                  <a:srgbClr val="FFFFFF"/>
+                </a:solidFill>
+              </a14:hiddenFill>
+            </a:ext>
+          </a:extLst>
+        </p:spPr>
+      </p:pic>
+      <p:grpSp>
+        <p:nvGrpSpPr>
+          <p:cNvPr id="10" name="Group 9">
+            <a:extLst>
+              <a:ext uri="{FF2B5EF4-FFF2-40B4-BE49-F238E27FC236}">
+                <a16:creationId xmlns:a16="http://schemas.microsoft.com/office/drawing/2014/main" id="{D7A8C770-7D2C-36D5-9A52-3452C7D9C852}"/>
+              </a:ext>
+            </a:extLst>
+          </p:cNvPr>
+          <p:cNvGrpSpPr/>
+          <p:nvPr/>
+        </p:nvGrpSpPr>
+        <p:grpSpPr>
+          <a:xfrm>
+            <a:off x="2117948" y="1352465"/>
+            <a:ext cx="7956104" cy="4642533"/>
+            <a:chOff x="2413000" y="966571"/>
+            <a:chExt cx="7956104" cy="4642533"/>
+          </a:xfrm>
+        </p:grpSpPr>
+        <p:sp>
+          <p:nvSpPr>
+            <p:cNvPr id="5" name="Rectangle 4">
+              <a:extLst>
+                <a:ext uri="{FF2B5EF4-FFF2-40B4-BE49-F238E27FC236}">
+                  <a16:creationId xmlns:a16="http://schemas.microsoft.com/office/drawing/2014/main" id="{35664653-C676-EE50-807F-34A2C15526C9}"/>
+                </a:ext>
+              </a:extLst>
+            </p:cNvPr>
+            <p:cNvSpPr/>
+            <p:nvPr/>
+          </p:nvSpPr>
+          <p:spPr>
+            <a:xfrm>
+              <a:off x="5240867" y="2794000"/>
+              <a:ext cx="2108200" cy="990600"/>
+            </a:xfrm>
+            <a:prstGeom prst="rect">
+              <a:avLst/>
+            </a:prstGeom>
+          </p:spPr>
+          <p:style>
+            <a:lnRef idx="2">
+              <a:schemeClr val="accent6">
+                <a:shade val="15000"/>
+              </a:schemeClr>
+            </a:lnRef>
+            <a:fillRef idx="1">
+              <a:schemeClr val="accent6"/>
+            </a:fillRef>
+            <a:effectRef idx="0">
+              <a:schemeClr val="accent6"/>
+            </a:effectRef>
+            <a:fontRef idx="minor">
+              <a:schemeClr val="lt1"/>
+            </a:fontRef>
+          </p:style>
+          <p:txBody>
+            <a:bodyPr rtlCol="0" anchor="ctr"/>
+            <a:lstStyle/>
+            <a:p>
+              <a:pPr algn="ctr"/>
+              <a:r>
+                <a:rPr lang="en-US" b="1" i="1" dirty="0"/>
+                <a:t>FACT_TRIPS</a:t>
+              </a:r>
+            </a:p>
+          </p:txBody>
+        </p:sp>
+        <p:sp>
+          <p:nvSpPr>
+            <p:cNvPr id="7" name="Rectangle 6">
+              <a:extLst>
+                <a:ext uri="{FF2B5EF4-FFF2-40B4-BE49-F238E27FC236}">
+                  <a16:creationId xmlns:a16="http://schemas.microsoft.com/office/drawing/2014/main" id="{C6AA597F-A6F2-F002-BBD3-00B1D5EE4393}"/>
+                </a:ext>
+              </a:extLst>
+            </p:cNvPr>
+            <p:cNvSpPr/>
+            <p:nvPr/>
+          </p:nvSpPr>
+          <p:spPr>
+            <a:xfrm>
+              <a:off x="2413000" y="2794000"/>
+              <a:ext cx="2108200" cy="990600"/>
+            </a:xfrm>
+            <a:prstGeom prst="rect">
+              <a:avLst/>
+            </a:prstGeom>
+            <a:solidFill>
+              <a:schemeClr val="accent1"/>
+            </a:solidFill>
+          </p:spPr>
+          <p:style>
+            <a:lnRef idx="2">
+              <a:schemeClr val="accent1">
+                <a:shade val="15000"/>
+              </a:schemeClr>
+            </a:lnRef>
+            <a:fillRef idx="1">
+              <a:schemeClr val="accent1"/>
+            </a:fillRef>
+            <a:effectRef idx="0">
+              <a:schemeClr val="accent1"/>
+            </a:effectRef>
+            <a:fontRef idx="minor">
+              <a:schemeClr val="lt1"/>
+            </a:fontRef>
+          </p:style>
+          <p:txBody>
+            <a:bodyPr rtlCol="0" anchor="ctr"/>
+            <a:lstStyle/>
+            <a:p>
+              <a:pPr algn="ctr"/>
+              <a:r>
+                <a:rPr lang="en-US" b="1" dirty="0"/>
+                <a:t>DIM_WEATHER</a:t>
+              </a:r>
+            </a:p>
+          </p:txBody>
+        </p:sp>
+        <p:cxnSp>
+          <p:nvCxnSpPr>
+            <p:cNvPr id="9" name="Straight Connector 8">
+              <a:extLst>
+                <a:ext uri="{FF2B5EF4-FFF2-40B4-BE49-F238E27FC236}">
+                  <a16:creationId xmlns:a16="http://schemas.microsoft.com/office/drawing/2014/main" id="{C5AEC542-D5DF-35B4-19AB-26EF6F0C68F4}"/>
+                </a:ext>
+              </a:extLst>
+            </p:cNvPr>
+            <p:cNvCxnSpPr>
+              <a:cxnSpLocks/>
+              <a:stCxn id="7" idx="3"/>
+              <a:endCxn id="5" idx="1"/>
+            </p:cNvCxnSpPr>
+            <p:nvPr/>
+          </p:nvCxnSpPr>
+          <p:spPr>
+            <a:xfrm>
+              <a:off x="4521200" y="3289300"/>
+              <a:ext cx="719667" cy="0"/>
+            </a:xfrm>
+            <a:prstGeom prst="line">
+              <a:avLst/>
+            </a:prstGeom>
+          </p:spPr>
+          <p:style>
+            <a:lnRef idx="3">
+              <a:schemeClr val="dk1"/>
+            </a:lnRef>
+            <a:fillRef idx="0">
+              <a:schemeClr val="dk1"/>
+            </a:fillRef>
+            <a:effectRef idx="2">
+              <a:schemeClr val="dk1"/>
+            </a:effectRef>
+            <a:fontRef idx="minor">
+              <a:schemeClr val="tx1"/>
+            </a:fontRef>
+          </p:style>
+        </p:cxnSp>
+        <p:sp>
+          <p:nvSpPr>
+            <p:cNvPr id="11" name="Rectangle 10">
+              <a:extLst>
+                <a:ext uri="{FF2B5EF4-FFF2-40B4-BE49-F238E27FC236}">
+                  <a16:creationId xmlns:a16="http://schemas.microsoft.com/office/drawing/2014/main" id="{4C61495A-D653-79C3-69DA-D858C3ACC305}"/>
+                </a:ext>
+              </a:extLst>
+            </p:cNvPr>
+            <p:cNvSpPr/>
+            <p:nvPr/>
+          </p:nvSpPr>
+          <p:spPr>
+            <a:xfrm>
+              <a:off x="5240867" y="4618504"/>
+              <a:ext cx="2108200" cy="990600"/>
+            </a:xfrm>
+            <a:prstGeom prst="rect">
+              <a:avLst/>
+            </a:prstGeom>
+            <a:solidFill>
+              <a:schemeClr val="bg1">
+                <a:lumMod val="65000"/>
+              </a:schemeClr>
+            </a:solidFill>
+          </p:spPr>
+          <p:style>
+            <a:lnRef idx="2">
+              <a:schemeClr val="accent1">
+                <a:shade val="15000"/>
+              </a:schemeClr>
+            </a:lnRef>
+            <a:fillRef idx="1">
+              <a:schemeClr val="accent1"/>
+            </a:fillRef>
+            <a:effectRef idx="0">
+              <a:schemeClr val="accent1"/>
+            </a:effectRef>
+            <a:fontRef idx="minor">
+              <a:schemeClr val="lt1"/>
+            </a:fontRef>
+          </p:style>
+          <p:txBody>
+            <a:bodyPr rtlCol="0" anchor="ctr"/>
+            <a:lstStyle/>
+            <a:p>
+              <a:pPr algn="ctr"/>
+              <a:r>
+                <a:rPr lang="en-US" b="1" dirty="0"/>
+                <a:t>DIM_DATE</a:t>
+              </a:r>
+            </a:p>
+          </p:txBody>
+        </p:sp>
+        <p:cxnSp>
+          <p:nvCxnSpPr>
+            <p:cNvPr id="12" name="Straight Connector 11">
+              <a:extLst>
+                <a:ext uri="{FF2B5EF4-FFF2-40B4-BE49-F238E27FC236}">
+                  <a16:creationId xmlns:a16="http://schemas.microsoft.com/office/drawing/2014/main" id="{36084D4E-4F46-29E6-0C61-C215809B80F5}"/>
+                </a:ext>
+              </a:extLst>
+            </p:cNvPr>
+            <p:cNvCxnSpPr>
+              <a:cxnSpLocks/>
+              <a:stCxn id="11" idx="0"/>
+              <a:endCxn id="5" idx="2"/>
+            </p:cNvCxnSpPr>
+            <p:nvPr/>
+          </p:nvCxnSpPr>
+          <p:spPr>
+            <a:xfrm flipV="1">
+              <a:off x="6294967" y="3784600"/>
+              <a:ext cx="0" cy="833904"/>
+            </a:xfrm>
+            <a:prstGeom prst="line">
+              <a:avLst/>
+            </a:prstGeom>
+          </p:spPr>
+          <p:style>
+            <a:lnRef idx="3">
+              <a:schemeClr val="dk1"/>
+            </a:lnRef>
+            <a:fillRef idx="0">
+              <a:schemeClr val="dk1"/>
+            </a:fillRef>
+            <a:effectRef idx="2">
+              <a:schemeClr val="dk1"/>
+            </a:effectRef>
+            <a:fontRef idx="minor">
+              <a:schemeClr val="tx1"/>
+            </a:fontRef>
+          </p:style>
+        </p:cxnSp>
+        <p:sp>
+          <p:nvSpPr>
+            <p:cNvPr id="19" name="Rectangle 18">
+              <a:extLst>
+                <a:ext uri="{FF2B5EF4-FFF2-40B4-BE49-F238E27FC236}">
+                  <a16:creationId xmlns:a16="http://schemas.microsoft.com/office/drawing/2014/main" id="{CEE30633-F905-FD6F-82E1-FE888356CA11}"/>
+                </a:ext>
+              </a:extLst>
+            </p:cNvPr>
+            <p:cNvSpPr/>
+            <p:nvPr/>
+          </p:nvSpPr>
+          <p:spPr>
+            <a:xfrm>
+              <a:off x="8260904" y="2794000"/>
+              <a:ext cx="2108200" cy="990600"/>
+            </a:xfrm>
+            <a:prstGeom prst="rect">
+              <a:avLst/>
+            </a:prstGeom>
+            <a:solidFill>
+              <a:srgbClr val="C00000"/>
+            </a:solidFill>
+          </p:spPr>
+          <p:style>
+            <a:lnRef idx="2">
+              <a:schemeClr val="accent1">
+                <a:shade val="15000"/>
+              </a:schemeClr>
+            </a:lnRef>
+            <a:fillRef idx="1">
+              <a:schemeClr val="accent1"/>
+            </a:fillRef>
+            <a:effectRef idx="0">
+              <a:schemeClr val="accent1"/>
+            </a:effectRef>
+            <a:fontRef idx="minor">
+              <a:schemeClr val="lt1"/>
+            </a:fontRef>
+          </p:style>
+          <p:txBody>
+            <a:bodyPr rtlCol="0" anchor="ctr"/>
+            <a:lstStyle/>
+            <a:p>
+              <a:pPr algn="ctr"/>
+              <a:r>
+                <a:rPr lang="en-US" b="1" dirty="0"/>
+                <a:t>DIM_USERS</a:t>
+              </a:r>
+            </a:p>
+          </p:txBody>
+        </p:sp>
+        <p:cxnSp>
+          <p:nvCxnSpPr>
+            <p:cNvPr id="20" name="Straight Connector 19">
+              <a:extLst>
+                <a:ext uri="{FF2B5EF4-FFF2-40B4-BE49-F238E27FC236}">
+                  <a16:creationId xmlns:a16="http://schemas.microsoft.com/office/drawing/2014/main" id="{17CA4AB2-7FF5-4660-B92A-D46FC0B4124C}"/>
+                </a:ext>
+              </a:extLst>
+            </p:cNvPr>
+            <p:cNvCxnSpPr>
+              <a:cxnSpLocks/>
+              <a:stCxn id="19" idx="1"/>
+              <a:endCxn id="5" idx="3"/>
+            </p:cNvCxnSpPr>
+            <p:nvPr/>
+          </p:nvCxnSpPr>
+          <p:spPr>
+            <a:xfrm flipH="1">
+              <a:off x="7349067" y="3289300"/>
+              <a:ext cx="911837" cy="0"/>
+            </a:xfrm>
+            <a:prstGeom prst="line">
+              <a:avLst/>
+            </a:prstGeom>
+          </p:spPr>
+          <p:style>
+            <a:lnRef idx="3">
+              <a:schemeClr val="dk1"/>
+            </a:lnRef>
+            <a:fillRef idx="0">
+              <a:schemeClr val="dk1"/>
+            </a:fillRef>
+            <a:effectRef idx="2">
+              <a:schemeClr val="dk1"/>
+            </a:effectRef>
+            <a:fontRef idx="minor">
+              <a:schemeClr val="tx1"/>
+            </a:fontRef>
+          </p:style>
+        </p:cxnSp>
+        <p:sp>
+          <p:nvSpPr>
+            <p:cNvPr id="24" name="Rectangle 23">
+              <a:extLst>
+                <a:ext uri="{FF2B5EF4-FFF2-40B4-BE49-F238E27FC236}">
+                  <a16:creationId xmlns:a16="http://schemas.microsoft.com/office/drawing/2014/main" id="{246C924B-DADC-17C1-D6B1-725F9C3168E2}"/>
+                </a:ext>
+              </a:extLst>
+            </p:cNvPr>
+            <p:cNvSpPr/>
+            <p:nvPr/>
+          </p:nvSpPr>
+          <p:spPr>
+            <a:xfrm>
+              <a:off x="5240867" y="969497"/>
+              <a:ext cx="2108200" cy="990600"/>
+            </a:xfrm>
+            <a:prstGeom prst="rect">
+              <a:avLst/>
+            </a:prstGeom>
+            <a:solidFill>
+              <a:srgbClr val="663300"/>
+            </a:solidFill>
+          </p:spPr>
+          <p:style>
+            <a:lnRef idx="2">
+              <a:schemeClr val="accent1">
+                <a:shade val="15000"/>
+              </a:schemeClr>
+            </a:lnRef>
+            <a:fillRef idx="1">
+              <a:schemeClr val="accent1"/>
+            </a:fillRef>
+            <a:effectRef idx="0">
+              <a:schemeClr val="accent1"/>
+            </a:effectRef>
+            <a:fontRef idx="minor">
+              <a:schemeClr val="lt1"/>
+            </a:fontRef>
+          </p:style>
+          <p:txBody>
+            <a:bodyPr rtlCol="0" anchor="ctr"/>
+            <a:lstStyle/>
+            <a:p>
+              <a:pPr algn="ctr"/>
+              <a:r>
+                <a:rPr lang="en-US" b="1" dirty="0"/>
+                <a:t>DIM_STATIONS</a:t>
+              </a:r>
+            </a:p>
+          </p:txBody>
+        </p:sp>
+        <p:cxnSp>
+          <p:nvCxnSpPr>
+            <p:cNvPr id="25" name="Straight Connector 24">
+              <a:extLst>
+                <a:ext uri="{FF2B5EF4-FFF2-40B4-BE49-F238E27FC236}">
+                  <a16:creationId xmlns:a16="http://schemas.microsoft.com/office/drawing/2014/main" id="{8078C34A-4BED-B5DD-0646-C926A49645ED}"/>
+                </a:ext>
+              </a:extLst>
+            </p:cNvPr>
+            <p:cNvCxnSpPr>
+              <a:cxnSpLocks/>
+              <a:stCxn id="24" idx="2"/>
+              <a:endCxn id="5" idx="0"/>
+            </p:cNvCxnSpPr>
+            <p:nvPr/>
+          </p:nvCxnSpPr>
+          <p:spPr>
+            <a:xfrm>
+              <a:off x="6294967" y="1960097"/>
+              <a:ext cx="0" cy="833903"/>
+            </a:xfrm>
+            <a:prstGeom prst="line">
+              <a:avLst/>
+            </a:prstGeom>
+          </p:spPr>
+          <p:style>
+            <a:lnRef idx="3">
+              <a:schemeClr val="dk1"/>
+            </a:lnRef>
+            <a:fillRef idx="0">
+              <a:schemeClr val="dk1"/>
+            </a:fillRef>
+            <a:effectRef idx="2">
+              <a:schemeClr val="dk1"/>
+            </a:effectRef>
+            <a:fontRef idx="minor">
+              <a:schemeClr val="tx1"/>
+            </a:fontRef>
+          </p:style>
+        </p:cxnSp>
+        <p:sp>
+          <p:nvSpPr>
+            <p:cNvPr id="29" name="Rectangle 28">
+              <a:extLst>
+                <a:ext uri="{FF2B5EF4-FFF2-40B4-BE49-F238E27FC236}">
+                  <a16:creationId xmlns:a16="http://schemas.microsoft.com/office/drawing/2014/main" id="{093CFCBC-1AEA-6111-BC8A-10AC11302B97}"/>
+                </a:ext>
+              </a:extLst>
+            </p:cNvPr>
+            <p:cNvSpPr/>
+            <p:nvPr/>
+          </p:nvSpPr>
+          <p:spPr>
+            <a:xfrm>
+              <a:off x="2413000" y="969497"/>
+              <a:ext cx="2108200" cy="990600"/>
+            </a:xfrm>
+            <a:prstGeom prst="rect">
+              <a:avLst/>
+            </a:prstGeom>
+            <a:solidFill>
+              <a:schemeClr val="accent6">
+                <a:lumMod val="50000"/>
+              </a:schemeClr>
+            </a:solidFill>
+          </p:spPr>
+          <p:style>
+            <a:lnRef idx="2">
+              <a:schemeClr val="accent1">
+                <a:shade val="15000"/>
+              </a:schemeClr>
+            </a:lnRef>
+            <a:fillRef idx="1">
+              <a:schemeClr val="accent1"/>
+            </a:fillRef>
+            <a:effectRef idx="0">
+              <a:schemeClr val="accent1"/>
+            </a:effectRef>
+            <a:fontRef idx="minor">
+              <a:schemeClr val="lt1"/>
+            </a:fontRef>
+          </p:style>
+          <p:txBody>
+            <a:bodyPr rtlCol="0" anchor="ctr"/>
+            <a:lstStyle/>
+            <a:p>
+              <a:pPr algn="ctr"/>
+              <a:r>
+                <a:rPr lang="en-US" b="1" dirty="0"/>
+                <a:t>DIM_GEOGRAPHY</a:t>
+              </a:r>
+            </a:p>
+          </p:txBody>
+        </p:sp>
+        <p:sp>
+          <p:nvSpPr>
+            <p:cNvPr id="30" name="Rectangle 29">
+              <a:extLst>
+                <a:ext uri="{FF2B5EF4-FFF2-40B4-BE49-F238E27FC236}">
+                  <a16:creationId xmlns:a16="http://schemas.microsoft.com/office/drawing/2014/main" id="{41E26045-45AC-CE92-3783-0C3E0E7F6AF0}"/>
+                </a:ext>
+              </a:extLst>
+            </p:cNvPr>
+            <p:cNvSpPr/>
+            <p:nvPr/>
+          </p:nvSpPr>
+          <p:spPr>
+            <a:xfrm>
+              <a:off x="8185403" y="966571"/>
+              <a:ext cx="2108200" cy="990600"/>
+            </a:xfrm>
+            <a:prstGeom prst="rect">
+              <a:avLst/>
+            </a:prstGeom>
+            <a:solidFill>
+              <a:schemeClr val="accent2"/>
+            </a:solidFill>
+          </p:spPr>
+          <p:style>
+            <a:lnRef idx="2">
+              <a:schemeClr val="accent1">
+                <a:shade val="15000"/>
+              </a:schemeClr>
+            </a:lnRef>
+            <a:fillRef idx="1">
+              <a:schemeClr val="accent1"/>
+            </a:fillRef>
+            <a:effectRef idx="0">
+              <a:schemeClr val="accent1"/>
+            </a:effectRef>
+            <a:fontRef idx="minor">
+              <a:schemeClr val="lt1"/>
+            </a:fontRef>
+          </p:style>
+          <p:txBody>
+            <a:bodyPr rtlCol="0" anchor="ctr"/>
+            <a:lstStyle/>
+            <a:p>
+              <a:pPr algn="ctr"/>
+              <a:r>
+                <a:rPr lang="en-US" b="1" dirty="0"/>
+                <a:t>DIM_MEMBERSHIP</a:t>
+              </a:r>
+              <a:endParaRPr lang="en-US" i="1" dirty="0"/>
+            </a:p>
+          </p:txBody>
+        </p:sp>
+        <p:cxnSp>
+          <p:nvCxnSpPr>
+            <p:cNvPr id="31" name="Straight Connector 30">
+              <a:extLst>
+                <a:ext uri="{FF2B5EF4-FFF2-40B4-BE49-F238E27FC236}">
+                  <a16:creationId xmlns:a16="http://schemas.microsoft.com/office/drawing/2014/main" id="{42CA042A-1265-CC01-B9EC-BE0FC4DF4222}"/>
+                </a:ext>
+              </a:extLst>
+            </p:cNvPr>
+            <p:cNvCxnSpPr>
+              <a:cxnSpLocks/>
+              <a:stCxn id="29" idx="2"/>
+              <a:endCxn id="5" idx="0"/>
+            </p:cNvCxnSpPr>
+            <p:nvPr/>
+          </p:nvCxnSpPr>
+          <p:spPr>
+            <a:xfrm>
+              <a:off x="3467100" y="1960097"/>
+              <a:ext cx="2827867" cy="833903"/>
+            </a:xfrm>
+            <a:prstGeom prst="line">
+              <a:avLst/>
+            </a:prstGeom>
+          </p:spPr>
+          <p:style>
+            <a:lnRef idx="3">
+              <a:schemeClr val="dk1"/>
+            </a:lnRef>
+            <a:fillRef idx="0">
+              <a:schemeClr val="dk1"/>
+            </a:fillRef>
+            <a:effectRef idx="2">
+              <a:schemeClr val="dk1"/>
+            </a:effectRef>
+            <a:fontRef idx="minor">
+              <a:schemeClr val="tx1"/>
+            </a:fontRef>
+          </p:style>
+        </p:cxnSp>
+        <p:cxnSp>
+          <p:nvCxnSpPr>
+            <p:cNvPr id="35" name="Straight Connector 34">
+              <a:extLst>
+                <a:ext uri="{FF2B5EF4-FFF2-40B4-BE49-F238E27FC236}">
+                  <a16:creationId xmlns:a16="http://schemas.microsoft.com/office/drawing/2014/main" id="{85665A26-B8D7-D43E-4BC8-35E3AD3ECF81}"/>
+                </a:ext>
+              </a:extLst>
+            </p:cNvPr>
+            <p:cNvCxnSpPr>
+              <a:cxnSpLocks/>
+              <a:stCxn id="39" idx="0"/>
+              <a:endCxn id="5" idx="2"/>
+            </p:cNvCxnSpPr>
+            <p:nvPr/>
+          </p:nvCxnSpPr>
+          <p:spPr>
+            <a:xfrm flipH="1" flipV="1">
+              <a:off x="6294967" y="3784600"/>
+              <a:ext cx="3020037" cy="833904"/>
+            </a:xfrm>
+            <a:prstGeom prst="line">
+              <a:avLst/>
+            </a:prstGeom>
+          </p:spPr>
+          <p:style>
+            <a:lnRef idx="3">
+              <a:schemeClr val="dk1"/>
+            </a:lnRef>
+            <a:fillRef idx="0">
+              <a:schemeClr val="dk1"/>
+            </a:fillRef>
+            <a:effectRef idx="2">
+              <a:schemeClr val="dk1"/>
+            </a:effectRef>
+            <a:fontRef idx="minor">
+              <a:schemeClr val="tx1"/>
+            </a:fontRef>
+          </p:style>
+        </p:cxnSp>
+        <p:sp>
+          <p:nvSpPr>
+            <p:cNvPr id="39" name="Rectangle 38">
+              <a:extLst>
+                <a:ext uri="{FF2B5EF4-FFF2-40B4-BE49-F238E27FC236}">
+                  <a16:creationId xmlns:a16="http://schemas.microsoft.com/office/drawing/2014/main" id="{04FCFBC0-FEF0-1663-49C8-A629CDEC3CD6}"/>
+                </a:ext>
+              </a:extLst>
+            </p:cNvPr>
+            <p:cNvSpPr/>
+            <p:nvPr/>
+          </p:nvSpPr>
+          <p:spPr>
+            <a:xfrm>
+              <a:off x="8260904" y="4618504"/>
+              <a:ext cx="2108200" cy="990600"/>
+            </a:xfrm>
+            <a:prstGeom prst="rect">
+              <a:avLst/>
+            </a:prstGeom>
+            <a:solidFill>
+              <a:srgbClr val="7030A0"/>
+            </a:solidFill>
+          </p:spPr>
+          <p:style>
+            <a:lnRef idx="2">
+              <a:schemeClr val="accent1">
+                <a:shade val="15000"/>
+              </a:schemeClr>
+            </a:lnRef>
+            <a:fillRef idx="1">
+              <a:schemeClr val="accent1"/>
+            </a:fillRef>
+            <a:effectRef idx="0">
+              <a:schemeClr val="accent1"/>
+            </a:effectRef>
+            <a:fontRef idx="minor">
+              <a:schemeClr val="lt1"/>
+            </a:fontRef>
+          </p:style>
+          <p:txBody>
+            <a:bodyPr rtlCol="0" anchor="ctr"/>
+            <a:lstStyle/>
+            <a:p>
+              <a:pPr algn="ctr"/>
+              <a:r>
+                <a:rPr lang="en-US" b="1" dirty="0"/>
+                <a:t>DIM_BIKES</a:t>
+              </a:r>
+            </a:p>
+          </p:txBody>
+        </p:sp>
+        <p:cxnSp>
+          <p:nvCxnSpPr>
+            <p:cNvPr id="48" name="Straight Connector 47">
+              <a:extLst>
+                <a:ext uri="{FF2B5EF4-FFF2-40B4-BE49-F238E27FC236}">
+                  <a16:creationId xmlns:a16="http://schemas.microsoft.com/office/drawing/2014/main" id="{D50E274C-66D1-8315-4399-BF195FE59CDE}"/>
+                </a:ext>
+              </a:extLst>
+            </p:cNvPr>
+            <p:cNvCxnSpPr>
+              <a:cxnSpLocks/>
+              <a:stCxn id="30" idx="2"/>
+              <a:endCxn id="5" idx="0"/>
+            </p:cNvCxnSpPr>
+            <p:nvPr/>
+          </p:nvCxnSpPr>
+          <p:spPr>
+            <a:xfrm flipH="1">
+              <a:off x="6294967" y="1957171"/>
+              <a:ext cx="2944536" cy="836829"/>
+            </a:xfrm>
+            <a:prstGeom prst="line">
+              <a:avLst/>
+            </a:prstGeom>
+          </p:spPr>
+          <p:style>
+            <a:lnRef idx="3">
+              <a:schemeClr val="dk1"/>
+            </a:lnRef>
+            <a:fillRef idx="0">
+              <a:schemeClr val="dk1"/>
+            </a:fillRef>
+            <a:effectRef idx="2">
+              <a:schemeClr val="dk1"/>
+            </a:effectRef>
+            <a:fontRef idx="minor">
+              <a:schemeClr val="tx1"/>
+            </a:fontRef>
+          </p:style>
+        </p:cxnSp>
+      </p:grpSp>
+    </p:spTree>
+    <p:extLst>
+      <p:ext uri="{BB962C8B-B14F-4D97-AF65-F5344CB8AC3E}">
+        <p14:creationId xmlns:p14="http://schemas.microsoft.com/office/powerpoint/2010/main" val="3741086770"/>
+      </p:ext>
+    </p:extLst>
+  </p:cSld>
+  <p:clrMapOvr>
+    <a:masterClrMapping/>
+  </p:clrMapOvr>
+</p:sld>
+</file>
+
+<file path=ppt/slides/slide27.xml><?xml version="1.0" encoding="utf-8"?>
+<p:sld xmlns:a="http://schemas.openxmlformats.org/drawingml/2006/main" xmlns:r="http://schemas.openxmlformats.org/officeDocument/2006/relationships" xmlns:p="http://schemas.openxmlformats.org/presentationml/2006/main">
+  <p:cSld>
+    <p:spTree>
+      <p:nvGrpSpPr>
+        <p:cNvPr id="1" name=""/>
+        <p:cNvGrpSpPr/>
+        <p:nvPr/>
+      </p:nvGrpSpPr>
+      <p:grpSpPr>
+        <a:xfrm>
+          <a:off x="0" y="0"/>
+          <a:ext cx="0" cy="0"/>
+          <a:chOff x="0" y="0"/>
+          <a:chExt cx="0" cy="0"/>
+        </a:xfrm>
+      </p:grpSpPr>
+      <p:sp>
+        <p:nvSpPr>
+          <p:cNvPr id="2" name="TextBox 1">
+            <a:extLst>
+              <a:ext uri="{FF2B5EF4-FFF2-40B4-BE49-F238E27FC236}">
+                <a16:creationId xmlns:a16="http://schemas.microsoft.com/office/drawing/2014/main" id="{15726383-B407-319E-030C-10F657ACC3A3}"/>
+              </a:ext>
+            </a:extLst>
+          </p:cNvPr>
+          <p:cNvSpPr txBox="1"/>
+          <p:nvPr/>
+        </p:nvSpPr>
+        <p:spPr>
+          <a:xfrm>
+            <a:off x="0" y="323165"/>
+            <a:ext cx="12192000" cy="646331"/>
+          </a:xfrm>
+          <a:prstGeom prst="rect">
+            <a:avLst/>
+          </a:prstGeom>
+          <a:noFill/>
+        </p:spPr>
+        <p:txBody>
+          <a:bodyPr wrap="square" rtlCol="0">
+            <a:spAutoFit/>
+          </a:bodyPr>
+          <a:lstStyle/>
+          <a:p>
+            <a:pPr algn="ctr"/>
+            <a:r>
+              <a:rPr lang="en-US" sz="3600" i="1" dirty="0">
+                <a:solidFill>
+                  <a:srgbClr val="7030A0"/>
+                </a:solidFill>
+                <a:latin typeface="Calisto MT" panose="02040603050505030304" pitchFamily="18" charset="0"/>
+              </a:rPr>
+              <a:t>Further Considerations – Physical Design</a:t>
+            </a:r>
+          </a:p>
+        </p:txBody>
+      </p:sp>
+      <p:grpSp>
+        <p:nvGrpSpPr>
+          <p:cNvPr id="6" name="Group 5">
+            <a:extLst>
+              <a:ext uri="{FF2B5EF4-FFF2-40B4-BE49-F238E27FC236}">
+                <a16:creationId xmlns:a16="http://schemas.microsoft.com/office/drawing/2014/main" id="{A1E19734-D7D8-9E28-7AA8-9A6664454463}"/>
+              </a:ext>
+            </a:extLst>
+          </p:cNvPr>
+          <p:cNvGrpSpPr/>
+          <p:nvPr/>
+        </p:nvGrpSpPr>
+        <p:grpSpPr>
+          <a:xfrm>
+            <a:off x="1131814" y="1447610"/>
+            <a:ext cx="9928371" cy="4423009"/>
+            <a:chOff x="556644" y="1930166"/>
+            <a:chExt cx="9928371" cy="4423009"/>
+          </a:xfrm>
+        </p:grpSpPr>
+        <p:sp>
+          <p:nvSpPr>
+            <p:cNvPr id="3" name="TextBox 2">
+              <a:extLst>
+                <a:ext uri="{FF2B5EF4-FFF2-40B4-BE49-F238E27FC236}">
+                  <a16:creationId xmlns:a16="http://schemas.microsoft.com/office/drawing/2014/main" id="{E9958844-E449-56FA-DB19-C09BE52AE9DD}"/>
+                </a:ext>
+              </a:extLst>
+            </p:cNvPr>
+            <p:cNvSpPr txBox="1"/>
+            <p:nvPr/>
+          </p:nvSpPr>
+          <p:spPr>
+            <a:xfrm>
+              <a:off x="556644" y="3767852"/>
+              <a:ext cx="4026716" cy="923330"/>
+            </a:xfrm>
+            <a:prstGeom prst="rect">
+              <a:avLst/>
+            </a:prstGeom>
+            <a:noFill/>
+          </p:spPr>
+          <p:txBody>
+            <a:bodyPr wrap="square" rtlCol="0">
+              <a:spAutoFit/>
+            </a:bodyPr>
+            <a:lstStyle/>
+            <a:p>
+              <a:pPr marL="285750" indent="-285750">
+                <a:buFont typeface="Wingdings" panose="05000000000000000000" pitchFamily="2" charset="2"/>
+                <a:buChar char="v"/>
+              </a:pPr>
+              <a:r>
+                <a:rPr lang="en-US" dirty="0">
+                  <a:solidFill>
+                    <a:schemeClr val="accent1"/>
+                  </a:solidFill>
+                </a:rPr>
+                <a:t>Operational Source System</a:t>
+              </a:r>
+            </a:p>
+            <a:p>
+              <a:pPr marL="742950" lvl="1" indent="-285750">
+                <a:buFont typeface="Wingdings" panose="05000000000000000000" pitchFamily="2" charset="2"/>
+                <a:buChar char="Ø"/>
+              </a:pPr>
+              <a:r>
+                <a:rPr lang="en-US" dirty="0"/>
+                <a:t>Defining an </a:t>
+              </a:r>
+              <a:r>
+                <a:rPr lang="en-US" b="1" u="sng" dirty="0"/>
+                <a:t>Indexing</a:t>
+              </a:r>
+              <a:r>
+                <a:rPr lang="en-US" dirty="0"/>
+                <a:t> Strategy</a:t>
+              </a:r>
+            </a:p>
+            <a:p>
+              <a:pPr marL="742950" lvl="1" indent="-285750">
+                <a:buFont typeface="Wingdings" panose="05000000000000000000" pitchFamily="2" charset="2"/>
+                <a:buChar char="Ø"/>
+              </a:pPr>
+              <a:endParaRPr lang="en-US" dirty="0"/>
+            </a:p>
+          </p:txBody>
+        </p:sp>
+        <p:pic>
+          <p:nvPicPr>
+            <p:cNvPr id="1026" name="Picture 2" descr="Data lake - Free electronics icons">
+              <a:extLst>
+                <a:ext uri="{FF2B5EF4-FFF2-40B4-BE49-F238E27FC236}">
+                  <a16:creationId xmlns:a16="http://schemas.microsoft.com/office/drawing/2014/main" id="{1823DB07-6F8A-0543-F59A-18DD2242CD8D}"/>
+                </a:ext>
+              </a:extLst>
+            </p:cNvPr>
+            <p:cNvPicPr>
+              <a:picLocks noChangeAspect="1" noChangeArrowheads="1"/>
+            </p:cNvPicPr>
+            <p:nvPr/>
+          </p:nvPicPr>
+          <p:blipFill>
+            <a:blip r:embed="rId2">
+              <a:extLst>
+                <a:ext uri="{28A0092B-C50C-407E-A947-70E740481C1C}">
+                  <a14:useLocalDpi xmlns:a14="http://schemas.microsoft.com/office/drawing/2010/main" val="0"/>
+                </a:ext>
+              </a:extLst>
+            </a:blip>
+            <a:srcRect/>
+            <a:stretch>
+              <a:fillRect/>
+            </a:stretch>
+          </p:blipFill>
+          <p:spPr bwMode="auto">
+            <a:xfrm>
+              <a:off x="1859909" y="1930166"/>
+              <a:ext cx="1420187" cy="1420187"/>
+            </a:xfrm>
+            <a:prstGeom prst="rect">
+              <a:avLst/>
+            </a:prstGeom>
+            <a:noFill/>
+            <a:extLst>
+              <a:ext uri="{909E8E84-426E-40DD-AFC4-6F175D3DCCD1}">
+                <a14:hiddenFill xmlns:a14="http://schemas.microsoft.com/office/drawing/2010/main">
+                  <a:solidFill>
+                    <a:srgbClr val="FFFFFF"/>
+                  </a:solidFill>
+                </a14:hiddenFill>
+              </a:ext>
+            </a:extLst>
+          </p:spPr>
+        </p:pic>
+        <p:pic>
+          <p:nvPicPr>
+            <p:cNvPr id="1028" name="Picture 4" descr="Data warehouse - Free computer icons">
+              <a:extLst>
+                <a:ext uri="{FF2B5EF4-FFF2-40B4-BE49-F238E27FC236}">
+                  <a16:creationId xmlns:a16="http://schemas.microsoft.com/office/drawing/2014/main" id="{CDC5B9F7-E0E5-BB92-0DF4-61EDF2642170}"/>
+                </a:ext>
+              </a:extLst>
+            </p:cNvPr>
+            <p:cNvPicPr>
+              <a:picLocks noChangeAspect="1" noChangeArrowheads="1"/>
+            </p:cNvPicPr>
+            <p:nvPr/>
+          </p:nvPicPr>
+          <p:blipFill>
+            <a:blip r:embed="rId3">
+              <a:extLst>
+                <a:ext uri="{28A0092B-C50C-407E-A947-70E740481C1C}">
+                  <a14:useLocalDpi xmlns:a14="http://schemas.microsoft.com/office/drawing/2010/main" val="0"/>
+                </a:ext>
+              </a:extLst>
+            </a:blip>
+            <a:srcRect/>
+            <a:stretch>
+              <a:fillRect/>
+            </a:stretch>
+          </p:blipFill>
+          <p:spPr bwMode="auto">
+            <a:xfrm>
+              <a:off x="7321142" y="1930166"/>
+              <a:ext cx="1420187" cy="1420187"/>
+            </a:xfrm>
+            <a:prstGeom prst="rect">
+              <a:avLst/>
+            </a:prstGeom>
+            <a:noFill/>
+            <a:extLst>
+              <a:ext uri="{909E8E84-426E-40DD-AFC4-6F175D3DCCD1}">
+                <a14:hiddenFill xmlns:a14="http://schemas.microsoft.com/office/drawing/2010/main">
+                  <a:solidFill>
+                    <a:srgbClr val="FFFFFF"/>
+                  </a:solidFill>
+                </a14:hiddenFill>
+              </a:ext>
+            </a:extLst>
+          </p:spPr>
+        </p:pic>
+        <p:sp>
+          <p:nvSpPr>
+            <p:cNvPr id="4" name="TextBox 3">
+              <a:extLst>
+                <a:ext uri="{FF2B5EF4-FFF2-40B4-BE49-F238E27FC236}">
+                  <a16:creationId xmlns:a16="http://schemas.microsoft.com/office/drawing/2014/main" id="{9169C8AD-2C2C-7B4D-6574-B4E14AFA31CE}"/>
+                </a:ext>
+              </a:extLst>
+            </p:cNvPr>
+            <p:cNvSpPr txBox="1"/>
+            <p:nvPr/>
+          </p:nvSpPr>
+          <p:spPr>
+            <a:xfrm>
+              <a:off x="5577455" y="3767852"/>
+              <a:ext cx="4907560" cy="2585323"/>
+            </a:xfrm>
+            <a:prstGeom prst="rect">
+              <a:avLst/>
+            </a:prstGeom>
+            <a:noFill/>
+          </p:spPr>
+          <p:txBody>
+            <a:bodyPr wrap="square" rtlCol="0">
+              <a:spAutoFit/>
+            </a:bodyPr>
+            <a:lstStyle/>
+            <a:p>
+              <a:pPr marL="285750" indent="-285750">
+                <a:buFont typeface="Wingdings" panose="05000000000000000000" pitchFamily="2" charset="2"/>
+                <a:buChar char="v"/>
+              </a:pPr>
+              <a:r>
+                <a:rPr lang="en-US" dirty="0">
+                  <a:solidFill>
+                    <a:srgbClr val="7030A0"/>
+                  </a:solidFill>
+                </a:rPr>
+                <a:t>DW/BI System</a:t>
+              </a:r>
+            </a:p>
+            <a:p>
+              <a:pPr marL="742950" lvl="1" indent="-285750">
+                <a:buFont typeface="Arial" panose="020B0604020202020204" pitchFamily="34" charset="0"/>
+                <a:buChar char="•"/>
+              </a:pPr>
+              <a:r>
+                <a:rPr lang="en-US" dirty="0"/>
+                <a:t>Defining a </a:t>
+              </a:r>
+              <a:r>
+                <a:rPr lang="en-US" b="1" u="sng" dirty="0"/>
+                <a:t>Partitioning</a:t>
+              </a:r>
+              <a:r>
+                <a:rPr lang="en-US" dirty="0"/>
+                <a:t> strategy</a:t>
+              </a:r>
+            </a:p>
+            <a:p>
+              <a:pPr marL="1200150" lvl="2" indent="-285750">
+                <a:buFont typeface="Wingdings" panose="05000000000000000000" pitchFamily="2" charset="2"/>
+                <a:buChar char="Ø"/>
+              </a:pPr>
+              <a:r>
+                <a:rPr lang="en-US" dirty="0"/>
+                <a:t>Select an appropriate Partition Key</a:t>
+              </a:r>
+            </a:p>
+            <a:p>
+              <a:pPr marL="1657350" lvl="3" indent="-285750">
+                <a:buFont typeface="Wingdings" panose="05000000000000000000" pitchFamily="2" charset="2"/>
+                <a:buChar char="Ø"/>
+              </a:pPr>
+              <a:r>
+                <a:rPr lang="en-US" dirty="0"/>
+                <a:t>E.g., Day</a:t>
+              </a:r>
+            </a:p>
+            <a:p>
+              <a:pPr marL="1200150" lvl="2" indent="-285750">
+                <a:buFont typeface="Wingdings" panose="05000000000000000000" pitchFamily="2" charset="2"/>
+                <a:buChar char="Ø"/>
+              </a:pPr>
+              <a:r>
+                <a:rPr lang="en-US" dirty="0"/>
+                <a:t>Avoid Data Skew/Hot Partitions</a:t>
+              </a:r>
+            </a:p>
+            <a:p>
+              <a:pPr marL="285750" indent="-285750">
+                <a:buFont typeface="Wingdings" panose="05000000000000000000" pitchFamily="2" charset="2"/>
+                <a:buChar char="Ø"/>
+              </a:pPr>
+              <a:endParaRPr lang="en-US" dirty="0"/>
+            </a:p>
+            <a:p>
+              <a:pPr marL="742950" lvl="1" indent="-285750">
+                <a:buFont typeface="Arial" panose="020B0604020202020204" pitchFamily="34" charset="0"/>
+                <a:buChar char="•"/>
+              </a:pPr>
+              <a:r>
+                <a:rPr lang="en-US" dirty="0"/>
+                <a:t>Defining a </a:t>
+              </a:r>
+              <a:r>
+                <a:rPr lang="en-US" b="1" u="sng" dirty="0"/>
+                <a:t>Clustering</a:t>
+              </a:r>
+              <a:r>
+                <a:rPr lang="en-US" dirty="0"/>
+                <a:t> strategy</a:t>
+              </a:r>
+            </a:p>
+            <a:p>
+              <a:pPr marL="1200150" lvl="2" indent="-285750">
+                <a:buFont typeface="Wingdings" panose="05000000000000000000" pitchFamily="2" charset="2"/>
+                <a:buChar char="Ø"/>
+              </a:pPr>
+              <a:r>
+                <a:rPr lang="en-US" dirty="0"/>
+                <a:t>Select an appropriate Clustering Field</a:t>
+              </a:r>
+            </a:p>
+            <a:p>
+              <a:pPr marL="1657350" lvl="3" indent="-285750">
+                <a:buFont typeface="Wingdings" panose="05000000000000000000" pitchFamily="2" charset="2"/>
+                <a:buChar char="Ø"/>
+              </a:pPr>
+              <a:r>
+                <a:rPr lang="en-US" dirty="0"/>
+                <a:t>E.g., City</a:t>
+              </a:r>
+            </a:p>
+          </p:txBody>
+        </p:sp>
+      </p:grpSp>
+      <p:pic>
+        <p:nvPicPr>
+          <p:cNvPr id="8" name="Picture 2" descr="FIRN Analytics: Timely Data Solutions &amp; Expert Consultancy">
+            <a:extLst>
+              <a:ext uri="{FF2B5EF4-FFF2-40B4-BE49-F238E27FC236}">
+                <a16:creationId xmlns:a16="http://schemas.microsoft.com/office/drawing/2014/main" id="{CF2D5A06-4F9E-FBAC-9608-9B81BE7C99DE}"/>
+              </a:ext>
+            </a:extLst>
+          </p:cNvPr>
+          <p:cNvPicPr>
+            <a:picLocks noChangeAspect="1" noChangeArrowheads="1"/>
+          </p:cNvPicPr>
+          <p:nvPr/>
+        </p:nvPicPr>
+        <p:blipFill>
+          <a:blip r:embed="rId4">
+            <a:extLst>
+              <a:ext uri="{28A0092B-C50C-407E-A947-70E740481C1C}">
+                <a14:useLocalDpi xmlns:a14="http://schemas.microsoft.com/office/drawing/2010/main" val="0"/>
+              </a:ext>
+            </a:extLst>
+          </a:blip>
+          <a:srcRect/>
+          <a:stretch>
+            <a:fillRect/>
+          </a:stretch>
+        </p:blipFill>
+        <p:spPr bwMode="auto">
+          <a:xfrm>
+            <a:off x="11182350" y="5848350"/>
+            <a:ext cx="1009650" cy="1009650"/>
+          </a:xfrm>
+          <a:prstGeom prst="rect">
+            <a:avLst/>
+          </a:prstGeom>
+          <a:noFill/>
+          <a:extLst>
+            <a:ext uri="{909E8E84-426E-40DD-AFC4-6F175D3DCCD1}">
+              <a14:hiddenFill xmlns:a14="http://schemas.microsoft.com/office/drawing/2010/main">
+                <a:solidFill>
+                  <a:srgbClr val="FFFFFF"/>
+                </a:solidFill>
+              </a14:hiddenFill>
+            </a:ext>
+          </a:extLst>
+        </p:spPr>
+      </p:pic>
+    </p:spTree>
+    <p:extLst>
+      <p:ext uri="{BB962C8B-B14F-4D97-AF65-F5344CB8AC3E}">
+        <p14:creationId xmlns:p14="http://schemas.microsoft.com/office/powerpoint/2010/main" val="1030075189"/>
+      </p:ext>
+    </p:extLst>
+  </p:cSld>
+  <p:clrMapOvr>
+    <a:masterClrMapping/>
+  </p:clrMapOvr>
+</p:sld>
+</file>
+
 <file path=ppt/slides/slide3.xml><?xml version="1.0" encoding="utf-8"?>
+<p:sld xmlns:a="http://schemas.openxmlformats.org/drawingml/2006/main" xmlns:r="http://schemas.openxmlformats.org/officeDocument/2006/relationships" xmlns:p="http://schemas.openxmlformats.org/presentationml/2006/main">
+  <p:cSld>
+    <p:spTree>
+      <p:nvGrpSpPr>
+        <p:cNvPr id="1" name=""/>
+        <p:cNvGrpSpPr/>
+        <p:nvPr/>
+      </p:nvGrpSpPr>
+      <p:grpSpPr>
+        <a:xfrm>
+          <a:off x="0" y="0"/>
+          <a:ext cx="0" cy="0"/>
+          <a:chOff x="0" y="0"/>
+          <a:chExt cx="0" cy="0"/>
+        </a:xfrm>
+      </p:grpSpPr>
+      <p:sp>
+        <p:nvSpPr>
+          <p:cNvPr id="2" name="TextBox 1">
+            <a:extLst>
+              <a:ext uri="{FF2B5EF4-FFF2-40B4-BE49-F238E27FC236}">
+                <a16:creationId xmlns:a16="http://schemas.microsoft.com/office/drawing/2014/main" id="{15726383-B407-319E-030C-10F657ACC3A3}"/>
+              </a:ext>
+            </a:extLst>
+          </p:cNvPr>
+          <p:cNvSpPr txBox="1"/>
+          <p:nvPr/>
+        </p:nvSpPr>
+        <p:spPr>
+          <a:xfrm>
+            <a:off x="0" y="323165"/>
+            <a:ext cx="12192000" cy="646331"/>
+          </a:xfrm>
+          <a:prstGeom prst="rect">
+            <a:avLst/>
+          </a:prstGeom>
+          <a:noFill/>
+        </p:spPr>
+        <p:txBody>
+          <a:bodyPr wrap="square" rtlCol="0">
+            <a:spAutoFit/>
+          </a:bodyPr>
+          <a:lstStyle/>
+          <a:p>
+            <a:pPr algn="ctr"/>
+            <a:r>
+              <a:rPr lang="en-US" sz="3600" i="1" dirty="0">
+                <a:solidFill>
+                  <a:srgbClr val="7030A0"/>
+                </a:solidFill>
+                <a:latin typeface="Calisto MT" panose="02040603050505030304" pitchFamily="18" charset="0"/>
+              </a:rPr>
+              <a:t>Business Requirements Definition</a:t>
+            </a:r>
+          </a:p>
+        </p:txBody>
+      </p:sp>
+      <p:pic>
+        <p:nvPicPr>
+          <p:cNvPr id="2050" name="Picture 2" descr="FIRN Analytics: Timely Data Solutions &amp; Expert Consultancy">
+            <a:extLst>
+              <a:ext uri="{FF2B5EF4-FFF2-40B4-BE49-F238E27FC236}">
+                <a16:creationId xmlns:a16="http://schemas.microsoft.com/office/drawing/2014/main" id="{14A52F25-2DAE-5DA7-4039-D4DC6699D305}"/>
+              </a:ext>
+            </a:extLst>
+          </p:cNvPr>
+          <p:cNvPicPr>
+            <a:picLocks noChangeAspect="1" noChangeArrowheads="1"/>
+          </p:cNvPicPr>
+          <p:nvPr/>
+        </p:nvPicPr>
+        <p:blipFill>
+          <a:blip r:embed="rId2">
+            <a:extLst>
+              <a:ext uri="{28A0092B-C50C-407E-A947-70E740481C1C}">
+                <a14:useLocalDpi xmlns:a14="http://schemas.microsoft.com/office/drawing/2010/main" val="0"/>
+              </a:ext>
+            </a:extLst>
+          </a:blip>
+          <a:srcRect/>
+          <a:stretch>
+            <a:fillRect/>
+          </a:stretch>
+        </p:blipFill>
+        <p:spPr bwMode="auto">
+          <a:xfrm>
+            <a:off x="11182350" y="5848350"/>
+            <a:ext cx="1009650" cy="1009650"/>
+          </a:xfrm>
+          <a:prstGeom prst="rect">
+            <a:avLst/>
+          </a:prstGeom>
+          <a:noFill/>
+          <a:extLst>
+            <a:ext uri="{909E8E84-426E-40DD-AFC4-6F175D3DCCD1}">
+              <a14:hiddenFill xmlns:a14="http://schemas.microsoft.com/office/drawing/2010/main">
+                <a:solidFill>
+                  <a:srgbClr val="FFFFFF"/>
+                </a:solidFill>
+              </a14:hiddenFill>
+            </a:ext>
+          </a:extLst>
+        </p:spPr>
+      </p:pic>
+      <p:grpSp>
+        <p:nvGrpSpPr>
+          <p:cNvPr id="8" name="Group 7">
+            <a:extLst>
+              <a:ext uri="{FF2B5EF4-FFF2-40B4-BE49-F238E27FC236}">
+                <a16:creationId xmlns:a16="http://schemas.microsoft.com/office/drawing/2014/main" id="{AC40E9C4-C06E-D8A3-AADA-DF53598EB866}"/>
+              </a:ext>
+            </a:extLst>
+          </p:cNvPr>
+          <p:cNvGrpSpPr/>
+          <p:nvPr/>
+        </p:nvGrpSpPr>
+        <p:grpSpPr>
+          <a:xfrm>
+            <a:off x="2751666" y="1678659"/>
+            <a:ext cx="6608167" cy="3389123"/>
+            <a:chOff x="2751666" y="1678659"/>
+            <a:chExt cx="6608167" cy="3389123"/>
+          </a:xfrm>
+        </p:grpSpPr>
+        <p:pic>
+          <p:nvPicPr>
+            <p:cNvPr id="5" name="Picture 4">
+              <a:extLst>
+                <a:ext uri="{FF2B5EF4-FFF2-40B4-BE49-F238E27FC236}">
+                  <a16:creationId xmlns:a16="http://schemas.microsoft.com/office/drawing/2014/main" id="{F223CCC0-1664-72B9-1170-0B4D430ABE91}"/>
+                </a:ext>
+              </a:extLst>
+            </p:cNvPr>
+            <p:cNvPicPr>
+              <a:picLocks noChangeAspect="1"/>
+            </p:cNvPicPr>
+            <p:nvPr/>
+          </p:nvPicPr>
+          <p:blipFill>
+            <a:blip r:embed="rId3"/>
+            <a:stretch>
+              <a:fillRect/>
+            </a:stretch>
+          </p:blipFill>
+          <p:spPr>
+            <a:xfrm>
+              <a:off x="2832167" y="1790217"/>
+              <a:ext cx="6527666" cy="3277565"/>
+            </a:xfrm>
+            <a:prstGeom prst="rect">
+              <a:avLst/>
+            </a:prstGeom>
+          </p:spPr>
+        </p:pic>
+        <p:sp>
+          <p:nvSpPr>
+            <p:cNvPr id="7" name="TextBox 6">
+              <a:extLst>
+                <a:ext uri="{FF2B5EF4-FFF2-40B4-BE49-F238E27FC236}">
+                  <a16:creationId xmlns:a16="http://schemas.microsoft.com/office/drawing/2014/main" id="{DFF79EFA-CA38-582E-F01A-8D06F5981F3B}"/>
+                </a:ext>
+              </a:extLst>
+            </p:cNvPr>
+            <p:cNvSpPr txBox="1"/>
+            <p:nvPr/>
+          </p:nvSpPr>
+          <p:spPr>
+            <a:xfrm>
+              <a:off x="2751666" y="1678659"/>
+              <a:ext cx="1303869" cy="3299742"/>
+            </a:xfrm>
+            <a:prstGeom prst="rect">
+              <a:avLst/>
+            </a:prstGeom>
+            <a:noFill/>
+            <a:ln w="38100">
+              <a:solidFill>
+                <a:srgbClr val="7030A0"/>
+              </a:solidFill>
+            </a:ln>
+          </p:spPr>
+          <p:txBody>
+            <a:bodyPr wrap="square" rtlCol="0">
+              <a:spAutoFit/>
+            </a:bodyPr>
+            <a:lstStyle/>
+            <a:p>
+              <a:endParaRPr lang="en-US" dirty="0"/>
+            </a:p>
+          </p:txBody>
+        </p:sp>
+      </p:grpSp>
+    </p:spTree>
+    <p:extLst>
+      <p:ext uri="{BB962C8B-B14F-4D97-AF65-F5344CB8AC3E}">
+        <p14:creationId xmlns:p14="http://schemas.microsoft.com/office/powerpoint/2010/main" val="2085280596"/>
+      </p:ext>
+    </p:extLst>
+  </p:cSld>
+  <p:clrMapOvr>
+    <a:masterClrMapping/>
+  </p:clrMapOvr>
+</p:sld>
+</file>
+
+<file path=ppt/slides/slide4.xml><?xml version="1.0" encoding="utf-8"?>
 <p:sld xmlns:a="http://schemas.openxmlformats.org/drawingml/2006/main" xmlns:r="http://schemas.openxmlformats.org/officeDocument/2006/relationships" xmlns:p="http://schemas.openxmlformats.org/presentationml/2006/main">
   <p:cSld>
     <p:spTree>
@@ -11226,7 +13858,7 @@
 </p:sld>
 </file>
 
-<file path=ppt/slides/slide4.xml><?xml version="1.0" encoding="utf-8"?>
+<file path=ppt/slides/slide5.xml><?xml version="1.0" encoding="utf-8"?>
 <p:sld xmlns:a="http://schemas.openxmlformats.org/drawingml/2006/main" xmlns:r="http://schemas.openxmlformats.org/officeDocument/2006/relationships" xmlns:p="http://schemas.openxmlformats.org/presentationml/2006/main">
   <p:cSld>
     <p:spTree>
@@ -11739,7 +14371,7 @@
 </p:sld>
 </file>
 
-<file path=ppt/slides/slide5.xml><?xml version="1.0" encoding="utf-8"?>
+<file path=ppt/slides/slide6.xml><?xml version="1.0" encoding="utf-8"?>
 <p:sld xmlns:a="http://schemas.openxmlformats.org/drawingml/2006/main" xmlns:r="http://schemas.openxmlformats.org/officeDocument/2006/relationships" xmlns:p="http://schemas.openxmlformats.org/presentationml/2006/main">
   <p:cSld>
     <p:spTree>
@@ -11945,7 +14577,7 @@
 </p:sld>
 </file>
 
-<file path=ppt/slides/slide6.xml><?xml version="1.0" encoding="utf-8"?>
+<file path=ppt/slides/slide7.xml><?xml version="1.0" encoding="utf-8"?>
 <p:sld xmlns:a="http://schemas.openxmlformats.org/drawingml/2006/main" xmlns:r="http://schemas.openxmlformats.org/officeDocument/2006/relationships" xmlns:p="http://schemas.openxmlformats.org/presentationml/2006/main">
   <p:cSld>
     <p:spTree>
@@ -12743,7 +15375,7 @@
 </p:sld>
 </file>
 
-<file path=ppt/slides/slide7.xml><?xml version="1.0" encoding="utf-8"?>
+<file path=ppt/slides/slide8.xml><?xml version="1.0" encoding="utf-8"?>
 <p:sld xmlns:a="http://schemas.openxmlformats.org/drawingml/2006/main" xmlns:r="http://schemas.openxmlformats.org/officeDocument/2006/relationships" xmlns:p="http://schemas.openxmlformats.org/presentationml/2006/main">
   <p:cSld>
     <p:spTree>
@@ -12949,7 +15581,7 @@
 </p:sld>
 </file>
 
-<file path=ppt/slides/slide8.xml><?xml version="1.0" encoding="utf-8"?>
+<file path=ppt/slides/slide9.xml><?xml version="1.0" encoding="utf-8"?>
 <p:sld xmlns:a="http://schemas.openxmlformats.org/drawingml/2006/main" xmlns:r="http://schemas.openxmlformats.org/officeDocument/2006/relationships" xmlns:p="http://schemas.openxmlformats.org/presentationml/2006/main">
   <p:cSld>
     <p:spTree>
@@ -13915,568 +16547,6 @@
     <p:extLst>
       <p:ext uri="{BB962C8B-B14F-4D97-AF65-F5344CB8AC3E}">
         <p14:creationId xmlns:p14="http://schemas.microsoft.com/office/powerpoint/2010/main" val="3005230554"/>
-      </p:ext>
-    </p:extLst>
-  </p:cSld>
-  <p:clrMapOvr>
-    <a:masterClrMapping/>
-  </p:clrMapOvr>
-</p:sld>
-</file>
-
-<file path=ppt/slides/slide9.xml><?xml version="1.0" encoding="utf-8"?>
-<p:sld xmlns:a="http://schemas.openxmlformats.org/drawingml/2006/main" xmlns:r="http://schemas.openxmlformats.org/officeDocument/2006/relationships" xmlns:p="http://schemas.openxmlformats.org/presentationml/2006/main">
-  <p:cSld>
-    <p:spTree>
-      <p:nvGrpSpPr>
-        <p:cNvPr id="1" name=""/>
-        <p:cNvGrpSpPr/>
-        <p:nvPr/>
-      </p:nvGrpSpPr>
-      <p:grpSpPr>
-        <a:xfrm>
-          <a:off x="0" y="0"/>
-          <a:ext cx="0" cy="0"/>
-          <a:chOff x="0" y="0"/>
-          <a:chExt cx="0" cy="0"/>
-        </a:xfrm>
-      </p:grpSpPr>
-      <p:sp>
-        <p:nvSpPr>
-          <p:cNvPr id="2" name="TextBox 1">
-            <a:extLst>
-              <a:ext uri="{FF2B5EF4-FFF2-40B4-BE49-F238E27FC236}">
-                <a16:creationId xmlns:a16="http://schemas.microsoft.com/office/drawing/2014/main" id="{15726383-B407-319E-030C-10F657ACC3A3}"/>
-              </a:ext>
-            </a:extLst>
-          </p:cNvPr>
-          <p:cNvSpPr txBox="1"/>
-          <p:nvPr/>
-        </p:nvSpPr>
-        <p:spPr>
-          <a:xfrm>
-            <a:off x="0" y="323165"/>
-            <a:ext cx="12192000" cy="646331"/>
-          </a:xfrm>
-          <a:prstGeom prst="rect">
-            <a:avLst/>
-          </a:prstGeom>
-          <a:noFill/>
-        </p:spPr>
-        <p:txBody>
-          <a:bodyPr wrap="square" rtlCol="0">
-            <a:spAutoFit/>
-          </a:bodyPr>
-          <a:lstStyle/>
-          <a:p>
-            <a:pPr algn="ctr"/>
-            <a:r>
-              <a:rPr lang="en-US" sz="3600" i="1" dirty="0">
-                <a:solidFill>
-                  <a:srgbClr val="7030A0"/>
-                </a:solidFill>
-                <a:latin typeface="Calisto MT" panose="02040603050505030304" pitchFamily="18" charset="0"/>
-              </a:rPr>
-              <a:t>Dbt Cloud – Connect to Snowflake via Partner Connect</a:t>
-            </a:r>
-          </a:p>
-        </p:txBody>
-      </p:sp>
-      <p:grpSp>
-        <p:nvGrpSpPr>
-          <p:cNvPr id="28" name="Group 27">
-            <a:extLst>
-              <a:ext uri="{FF2B5EF4-FFF2-40B4-BE49-F238E27FC236}">
-                <a16:creationId xmlns:a16="http://schemas.microsoft.com/office/drawing/2014/main" id="{A804D14B-5C44-4BD6-B1F0-9292D7F7B520}"/>
-              </a:ext>
-            </a:extLst>
-          </p:cNvPr>
-          <p:cNvGrpSpPr/>
-          <p:nvPr/>
-        </p:nvGrpSpPr>
-        <p:grpSpPr>
-          <a:xfrm>
-            <a:off x="404812" y="1431037"/>
-            <a:ext cx="11382375" cy="4327255"/>
-            <a:chOff x="0" y="1659637"/>
-            <a:chExt cx="11382375" cy="4327255"/>
-          </a:xfrm>
-        </p:grpSpPr>
-        <p:grpSp>
-          <p:nvGrpSpPr>
-            <p:cNvPr id="21" name="Group 20">
-              <a:extLst>
-                <a:ext uri="{FF2B5EF4-FFF2-40B4-BE49-F238E27FC236}">
-                  <a16:creationId xmlns:a16="http://schemas.microsoft.com/office/drawing/2014/main" id="{4B45B0D1-99CF-86C4-71B8-FDF85EFDD0BF}"/>
-                </a:ext>
-              </a:extLst>
-            </p:cNvPr>
-            <p:cNvGrpSpPr/>
-            <p:nvPr/>
-          </p:nvGrpSpPr>
-          <p:grpSpPr>
-            <a:xfrm>
-              <a:off x="0" y="1659637"/>
-              <a:ext cx="11382375" cy="4327255"/>
-              <a:chOff x="0" y="1659637"/>
-              <a:chExt cx="11382375" cy="4327255"/>
-            </a:xfrm>
-          </p:grpSpPr>
-          <p:pic>
-            <p:nvPicPr>
-              <p:cNvPr id="1026" name="Picture 2" descr="Snowflake Partner Connect Box">
-                <a:extLst>
-                  <a:ext uri="{FF2B5EF4-FFF2-40B4-BE49-F238E27FC236}">
-                    <a16:creationId xmlns:a16="http://schemas.microsoft.com/office/drawing/2014/main" id="{15FFF6E1-5538-115A-23B0-F6D96A68F38D}"/>
-                  </a:ext>
-                </a:extLst>
-              </p:cNvPr>
-              <p:cNvPicPr>
-                <a:picLocks noChangeAspect="1" noChangeArrowheads="1"/>
-              </p:cNvPicPr>
-              <p:nvPr/>
-            </p:nvPicPr>
-            <p:blipFill>
-              <a:blip r:embed="rId2">
-                <a:extLst>
-                  <a:ext uri="{28A0092B-C50C-407E-A947-70E740481C1C}">
-                    <a14:useLocalDpi xmlns:a14="http://schemas.microsoft.com/office/drawing/2010/main" val="0"/>
-                  </a:ext>
-                </a:extLst>
-              </a:blip>
-              <a:srcRect/>
-              <a:stretch>
-                <a:fillRect/>
-              </a:stretch>
-            </p:blipFill>
-            <p:spPr bwMode="auto">
-              <a:xfrm>
-                <a:off x="0" y="2419349"/>
-                <a:ext cx="3446941" cy="3038475"/>
-              </a:xfrm>
-              <a:prstGeom prst="rect">
-                <a:avLst/>
-              </a:prstGeom>
-              <a:noFill/>
-              <a:extLst>
-                <a:ext uri="{909E8E84-426E-40DD-AFC4-6F175D3DCCD1}">
-                  <a14:hiddenFill xmlns:a14="http://schemas.microsoft.com/office/drawing/2010/main">
-                    <a:solidFill>
-                      <a:srgbClr val="FFFFFF"/>
-                    </a:solidFill>
-                  </a14:hiddenFill>
-                </a:ext>
-              </a:extLst>
-            </p:spPr>
-          </p:pic>
-          <p:pic>
-            <p:nvPicPr>
-              <p:cNvPr id="1030" name="Picture 6" descr="Snowflake New UI - Connection Box">
-                <a:extLst>
-                  <a:ext uri="{FF2B5EF4-FFF2-40B4-BE49-F238E27FC236}">
-                    <a16:creationId xmlns:a16="http://schemas.microsoft.com/office/drawing/2014/main" id="{66723F01-75B2-E582-6649-ABB958F404C6}"/>
-                  </a:ext>
-                </a:extLst>
-              </p:cNvPr>
-              <p:cNvPicPr>
-                <a:picLocks noChangeAspect="1" noChangeArrowheads="1"/>
-              </p:cNvPicPr>
-              <p:nvPr/>
-            </p:nvPicPr>
-            <p:blipFill>
-              <a:blip r:embed="rId3">
-                <a:extLst>
-                  <a:ext uri="{28A0092B-C50C-407E-A947-70E740481C1C}">
-                    <a14:useLocalDpi xmlns:a14="http://schemas.microsoft.com/office/drawing/2010/main" val="0"/>
-                  </a:ext>
-                </a:extLst>
-              </a:blip>
-              <a:srcRect/>
-              <a:stretch>
-                <a:fillRect/>
-              </a:stretch>
-            </p:blipFill>
-            <p:spPr bwMode="auto">
-              <a:xfrm>
-                <a:off x="4278462" y="2105026"/>
-                <a:ext cx="3113660" cy="3667124"/>
-              </a:xfrm>
-              <a:prstGeom prst="rect">
-                <a:avLst/>
-              </a:prstGeom>
-              <a:noFill/>
-              <a:extLst>
-                <a:ext uri="{909E8E84-426E-40DD-AFC4-6F175D3DCCD1}">
-                  <a14:hiddenFill xmlns:a14="http://schemas.microsoft.com/office/drawing/2010/main">
-                    <a:solidFill>
-                      <a:srgbClr val="FFFFFF"/>
-                    </a:solidFill>
-                  </a14:hiddenFill>
-                </a:ext>
-              </a:extLst>
-            </p:spPr>
-          </p:pic>
-          <p:grpSp>
-            <p:nvGrpSpPr>
-              <p:cNvPr id="17" name="Group 16">
-                <a:extLst>
-                  <a:ext uri="{FF2B5EF4-FFF2-40B4-BE49-F238E27FC236}">
-                    <a16:creationId xmlns:a16="http://schemas.microsoft.com/office/drawing/2014/main" id="{B1A400E6-3BE8-AD15-A44F-FBC400C79111}"/>
-                  </a:ext>
-                </a:extLst>
-              </p:cNvPr>
-              <p:cNvGrpSpPr/>
-              <p:nvPr/>
-            </p:nvGrpSpPr>
-            <p:grpSpPr>
-              <a:xfrm>
-                <a:off x="8425013" y="2205037"/>
-                <a:ext cx="2957362" cy="3781855"/>
-                <a:chOff x="8425013" y="1557337"/>
-                <a:chExt cx="2957362" cy="3781855"/>
-              </a:xfrm>
-            </p:grpSpPr>
-            <p:pic>
-              <p:nvPicPr>
-                <p:cNvPr id="4" name="Picture 3">
-                  <a:extLst>
-                    <a:ext uri="{FF2B5EF4-FFF2-40B4-BE49-F238E27FC236}">
-                      <a16:creationId xmlns:a16="http://schemas.microsoft.com/office/drawing/2014/main" id="{7372E2F3-A85C-CAEE-F762-194295DCD4D5}"/>
-                    </a:ext>
-                  </a:extLst>
-                </p:cNvPr>
-                <p:cNvPicPr>
-                  <a:picLocks noChangeAspect="1"/>
-                </p:cNvPicPr>
-                <p:nvPr/>
-              </p:nvPicPr>
-              <p:blipFill>
-                <a:blip r:embed="rId4"/>
-                <a:srcRect r="66002"/>
-                <a:stretch/>
-              </p:blipFill>
-              <p:spPr>
-                <a:xfrm>
-                  <a:off x="8425014" y="3852863"/>
-                  <a:ext cx="2407218" cy="1486329"/>
-                </a:xfrm>
-                <a:prstGeom prst="rect">
-                  <a:avLst/>
-                </a:prstGeom>
-              </p:spPr>
-            </p:pic>
-            <p:pic>
-              <p:nvPicPr>
-                <p:cNvPr id="9" name="Picture 8">
-                  <a:extLst>
-                    <a:ext uri="{FF2B5EF4-FFF2-40B4-BE49-F238E27FC236}">
-                      <a16:creationId xmlns:a16="http://schemas.microsoft.com/office/drawing/2014/main" id="{F08D0736-E2E2-28B6-C09D-DC3003FC5B82}"/>
-                    </a:ext>
-                  </a:extLst>
-                </p:cNvPr>
-                <p:cNvPicPr>
-                  <a:picLocks noChangeAspect="1"/>
-                </p:cNvPicPr>
-                <p:nvPr/>
-              </p:nvPicPr>
-              <p:blipFill>
-                <a:blip r:embed="rId5"/>
-                <a:srcRect l="-1" t="69885" r="54876"/>
-                <a:stretch/>
-              </p:blipFill>
-              <p:spPr>
-                <a:xfrm>
-                  <a:off x="8425013" y="2705100"/>
-                  <a:ext cx="2957362" cy="1009795"/>
-                </a:xfrm>
-                <a:prstGeom prst="rect">
-                  <a:avLst/>
-                </a:prstGeom>
-              </p:spPr>
-            </p:pic>
-            <p:pic>
-              <p:nvPicPr>
-                <p:cNvPr id="14" name="Picture 13">
-                  <a:extLst>
-                    <a:ext uri="{FF2B5EF4-FFF2-40B4-BE49-F238E27FC236}">
-                      <a16:creationId xmlns:a16="http://schemas.microsoft.com/office/drawing/2014/main" id="{4C0CA0B4-E251-3639-3306-9DB0199F1E2C}"/>
-                    </a:ext>
-                  </a:extLst>
-                </p:cNvPr>
-                <p:cNvPicPr>
-                  <a:picLocks noChangeAspect="1"/>
-                </p:cNvPicPr>
-                <p:nvPr/>
-              </p:nvPicPr>
-              <p:blipFill>
-                <a:blip r:embed="rId5"/>
-                <a:srcRect r="60286" b="65770"/>
-                <a:stretch/>
-              </p:blipFill>
-              <p:spPr>
-                <a:xfrm>
-                  <a:off x="8425014" y="1557337"/>
-                  <a:ext cx="2407218" cy="1147763"/>
-                </a:xfrm>
-                <a:prstGeom prst="rect">
-                  <a:avLst/>
-                </a:prstGeom>
-              </p:spPr>
-            </p:pic>
-          </p:grpSp>
-          <p:sp>
-            <p:nvSpPr>
-              <p:cNvPr id="18" name="TextBox 17">
-                <a:extLst>
-                  <a:ext uri="{FF2B5EF4-FFF2-40B4-BE49-F238E27FC236}">
-                    <a16:creationId xmlns:a16="http://schemas.microsoft.com/office/drawing/2014/main" id="{F7A1BBAA-12B2-57C9-EA76-77C5962B09E0}"/>
-                  </a:ext>
-                </a:extLst>
-              </p:cNvPr>
-              <p:cNvSpPr txBox="1"/>
-              <p:nvPr/>
-            </p:nvSpPr>
-            <p:spPr>
-              <a:xfrm>
-                <a:off x="1318658" y="1659637"/>
-                <a:ext cx="809624" cy="369332"/>
-              </a:xfrm>
-              <a:prstGeom prst="rect">
-                <a:avLst/>
-              </a:prstGeom>
-              <a:noFill/>
-            </p:spPr>
-            <p:txBody>
-              <a:bodyPr wrap="square" rtlCol="0">
-                <a:spAutoFit/>
-              </a:bodyPr>
-              <a:lstStyle/>
-              <a:p>
-                <a:r>
-                  <a:rPr lang="en-US" dirty="0">
-                    <a:solidFill>
-                      <a:srgbClr val="00B0F0"/>
-                    </a:solidFill>
-                  </a:rPr>
-                  <a:t>Step 1</a:t>
-                </a:r>
-              </a:p>
-            </p:txBody>
-          </p:sp>
-          <p:sp>
-            <p:nvSpPr>
-              <p:cNvPr id="19" name="TextBox 18">
-                <a:extLst>
-                  <a:ext uri="{FF2B5EF4-FFF2-40B4-BE49-F238E27FC236}">
-                    <a16:creationId xmlns:a16="http://schemas.microsoft.com/office/drawing/2014/main" id="{F7DFB7E8-CEE0-0CFE-A298-2F02B083BDA8}"/>
-                  </a:ext>
-                </a:extLst>
-              </p:cNvPr>
-              <p:cNvSpPr txBox="1"/>
-              <p:nvPr/>
-            </p:nvSpPr>
-            <p:spPr>
-              <a:xfrm>
-                <a:off x="5430480" y="1659637"/>
-                <a:ext cx="809624" cy="369332"/>
-              </a:xfrm>
-              <a:prstGeom prst="rect">
-                <a:avLst/>
-              </a:prstGeom>
-              <a:noFill/>
-            </p:spPr>
-            <p:txBody>
-              <a:bodyPr wrap="square" rtlCol="0">
-                <a:spAutoFit/>
-              </a:bodyPr>
-              <a:lstStyle/>
-              <a:p>
-                <a:r>
-                  <a:rPr lang="en-US" dirty="0">
-                    <a:solidFill>
-                      <a:srgbClr val="00B0F0"/>
-                    </a:solidFill>
-                  </a:rPr>
-                  <a:t>Step 2</a:t>
-                </a:r>
-              </a:p>
-            </p:txBody>
-          </p:sp>
-          <p:sp>
-            <p:nvSpPr>
-              <p:cNvPr id="20" name="TextBox 19">
-                <a:extLst>
-                  <a:ext uri="{FF2B5EF4-FFF2-40B4-BE49-F238E27FC236}">
-                    <a16:creationId xmlns:a16="http://schemas.microsoft.com/office/drawing/2014/main" id="{7AC52878-3692-FB2A-1322-BEE5B3070048}"/>
-                  </a:ext>
-                </a:extLst>
-              </p:cNvPr>
-              <p:cNvSpPr txBox="1"/>
-              <p:nvPr/>
-            </p:nvSpPr>
-            <p:spPr>
-              <a:xfrm>
-                <a:off x="9326205" y="1659637"/>
-                <a:ext cx="809624" cy="369332"/>
-              </a:xfrm>
-              <a:prstGeom prst="rect">
-                <a:avLst/>
-              </a:prstGeom>
-              <a:noFill/>
-            </p:spPr>
-            <p:txBody>
-              <a:bodyPr wrap="square" rtlCol="0">
-                <a:spAutoFit/>
-              </a:bodyPr>
-              <a:lstStyle/>
-              <a:p>
-                <a:r>
-                  <a:rPr lang="en-US" dirty="0">
-                    <a:solidFill>
-                      <a:schemeClr val="accent2"/>
-                    </a:solidFill>
-                  </a:rPr>
-                  <a:t>Step 3</a:t>
-                </a:r>
-              </a:p>
-            </p:txBody>
-          </p:sp>
-        </p:grpSp>
-        <p:cxnSp>
-          <p:nvCxnSpPr>
-            <p:cNvPr id="23" name="Straight Arrow Connector 22">
-              <a:extLst>
-                <a:ext uri="{FF2B5EF4-FFF2-40B4-BE49-F238E27FC236}">
-                  <a16:creationId xmlns:a16="http://schemas.microsoft.com/office/drawing/2014/main" id="{3A61F3D3-DD3F-9229-6E88-2475FFA937B2}"/>
-                </a:ext>
-              </a:extLst>
-            </p:cNvPr>
-            <p:cNvCxnSpPr>
-              <a:stCxn id="1026" idx="3"/>
-              <a:endCxn id="1030" idx="1"/>
-            </p:cNvCxnSpPr>
-            <p:nvPr/>
-          </p:nvCxnSpPr>
-          <p:spPr>
-            <a:xfrm>
-              <a:off x="3446941" y="3938587"/>
-              <a:ext cx="831521" cy="1"/>
-            </a:xfrm>
-            <a:prstGeom prst="straightConnector1">
-              <a:avLst/>
-            </a:prstGeom>
-            <a:ln w="38100">
-              <a:tailEnd type="triangle"/>
-            </a:ln>
-          </p:spPr>
-          <p:style>
-            <a:lnRef idx="3">
-              <a:schemeClr val="dk1"/>
-            </a:lnRef>
-            <a:fillRef idx="0">
-              <a:schemeClr val="dk1"/>
-            </a:fillRef>
-            <a:effectRef idx="2">
-              <a:schemeClr val="dk1"/>
-            </a:effectRef>
-            <a:fontRef idx="minor">
-              <a:schemeClr val="tx1"/>
-            </a:fontRef>
-          </p:style>
-        </p:cxnSp>
-        <p:cxnSp>
-          <p:nvCxnSpPr>
-            <p:cNvPr id="25" name="Straight Arrow Connector 24">
-              <a:extLst>
-                <a:ext uri="{FF2B5EF4-FFF2-40B4-BE49-F238E27FC236}">
-                  <a16:creationId xmlns:a16="http://schemas.microsoft.com/office/drawing/2014/main" id="{CF0D9792-C16B-5821-6F1B-B480FB1B977C}"/>
-                </a:ext>
-              </a:extLst>
-            </p:cNvPr>
-            <p:cNvCxnSpPr>
-              <a:cxnSpLocks/>
-            </p:cNvCxnSpPr>
-            <p:nvPr/>
-          </p:nvCxnSpPr>
-          <p:spPr>
-            <a:xfrm>
-              <a:off x="7593491" y="3938586"/>
-              <a:ext cx="831521" cy="1"/>
-            </a:xfrm>
-            <a:prstGeom prst="straightConnector1">
-              <a:avLst/>
-            </a:prstGeom>
-            <a:ln w="38100">
-              <a:tailEnd type="triangle"/>
-            </a:ln>
-          </p:spPr>
-          <p:style>
-            <a:lnRef idx="3">
-              <a:schemeClr val="dk1"/>
-            </a:lnRef>
-            <a:fillRef idx="0">
-              <a:schemeClr val="dk1"/>
-            </a:fillRef>
-            <a:effectRef idx="2">
-              <a:schemeClr val="dk1"/>
-            </a:effectRef>
-            <a:fontRef idx="minor">
-              <a:schemeClr val="tx1"/>
-            </a:fontRef>
-          </p:style>
-        </p:cxnSp>
-      </p:grpSp>
-      <p:pic>
-        <p:nvPicPr>
-          <p:cNvPr id="30" name="Picture 2" descr="FIRN Analytics: Timely Data Solutions &amp; Expert Consultancy">
-            <a:extLst>
-              <a:ext uri="{FF2B5EF4-FFF2-40B4-BE49-F238E27FC236}">
-                <a16:creationId xmlns:a16="http://schemas.microsoft.com/office/drawing/2014/main" id="{EC4E0CB6-A9A1-AA93-273B-B557BE6509DC}"/>
-              </a:ext>
-            </a:extLst>
-          </p:cNvPr>
-          <p:cNvPicPr>
-            <a:picLocks noChangeAspect="1" noChangeArrowheads="1"/>
-          </p:cNvPicPr>
-          <p:nvPr/>
-        </p:nvPicPr>
-        <p:blipFill>
-          <a:blip r:embed="rId6">
-            <a:extLst>
-              <a:ext uri="{28A0092B-C50C-407E-A947-70E740481C1C}">
-                <a14:useLocalDpi xmlns:a14="http://schemas.microsoft.com/office/drawing/2010/main" val="0"/>
-              </a:ext>
-            </a:extLst>
-          </a:blip>
-          <a:srcRect/>
-          <a:stretch>
-            <a:fillRect/>
-          </a:stretch>
-        </p:blipFill>
-        <p:spPr bwMode="auto">
-          <a:xfrm>
-            <a:off x="11182350" y="5848350"/>
-            <a:ext cx="1009650" cy="1009650"/>
-          </a:xfrm>
-          <a:prstGeom prst="rect">
-            <a:avLst/>
-          </a:prstGeom>
-          <a:noFill/>
-          <a:extLst>
-            <a:ext uri="{909E8E84-426E-40DD-AFC4-6F175D3DCCD1}">
-              <a14:hiddenFill xmlns:a14="http://schemas.microsoft.com/office/drawing/2010/main">
-                <a:solidFill>
-                  <a:srgbClr val="FFFFFF"/>
-                </a:solidFill>
-              </a14:hiddenFill>
-            </a:ext>
-          </a:extLst>
-        </p:spPr>
-      </p:pic>
-    </p:spTree>
-    <p:extLst>
-      <p:ext uri="{BB962C8B-B14F-4D97-AF65-F5344CB8AC3E}">
-        <p14:creationId xmlns:p14="http://schemas.microsoft.com/office/powerpoint/2010/main" val="1547502742"/>
       </p:ext>
     </p:extLst>
   </p:cSld>

</xml_diff>